<commit_message>
Added the expansion image.
</commit_message>
<xml_diff>
--- a/docs/Algorithm.pptx
+++ b/docs/Algorithm.pptx
@@ -6,6 +6,7 @@
   </p:sldMasterIdLst>
   <p:sldIdLst>
     <p:sldId id="256" r:id="rId2"/>
+    <p:sldId id="257" r:id="rId3"/>
   </p:sldIdLst>
   <p:sldSz cx="12192000" cy="6858000"/>
   <p:notesSz cx="6858000" cy="9144000"/>
@@ -258,7 +259,7 @@
               <a:rPr lang="en-CA" smtClean="0"/>
               <a:t>2021-01-07</a:t>
             </a:fld>
-            <a:endParaRPr lang="en-CA"/>
+            <a:endParaRPr lang="en-CA" dirty="0"/>
           </a:p>
         </p:txBody>
       </p:sp>
@@ -283,7 +284,7 @@
           <a:bodyPr/>
           <a:lstStyle/>
           <a:p>
-            <a:endParaRPr lang="en-CA"/>
+            <a:endParaRPr lang="en-CA" dirty="0"/>
           </a:p>
         </p:txBody>
       </p:sp>
@@ -312,7 +313,7 @@
               <a:rPr lang="en-CA" smtClean="0"/>
               <a:t>‹#›</a:t>
             </a:fld>
-            <a:endParaRPr lang="en-CA"/>
+            <a:endParaRPr lang="en-CA" dirty="0"/>
           </a:p>
         </p:txBody>
       </p:sp>
@@ -458,7 +459,7 @@
               <a:rPr lang="en-CA" smtClean="0"/>
               <a:t>2021-01-07</a:t>
             </a:fld>
-            <a:endParaRPr lang="en-CA"/>
+            <a:endParaRPr lang="en-CA" dirty="0"/>
           </a:p>
         </p:txBody>
       </p:sp>
@@ -483,7 +484,7 @@
           <a:bodyPr/>
           <a:lstStyle/>
           <a:p>
-            <a:endParaRPr lang="en-CA"/>
+            <a:endParaRPr lang="en-CA" dirty="0"/>
           </a:p>
         </p:txBody>
       </p:sp>
@@ -512,7 +513,7 @@
               <a:rPr lang="en-CA" smtClean="0"/>
               <a:t>‹#›</a:t>
             </a:fld>
-            <a:endParaRPr lang="en-CA"/>
+            <a:endParaRPr lang="en-CA" dirty="0"/>
           </a:p>
         </p:txBody>
       </p:sp>
@@ -668,7 +669,7 @@
               <a:rPr lang="en-CA" smtClean="0"/>
               <a:t>2021-01-07</a:t>
             </a:fld>
-            <a:endParaRPr lang="en-CA"/>
+            <a:endParaRPr lang="en-CA" dirty="0"/>
           </a:p>
         </p:txBody>
       </p:sp>
@@ -693,7 +694,7 @@
           <a:bodyPr/>
           <a:lstStyle/>
           <a:p>
-            <a:endParaRPr lang="en-CA"/>
+            <a:endParaRPr lang="en-CA" dirty="0"/>
           </a:p>
         </p:txBody>
       </p:sp>
@@ -722,7 +723,7 @@
               <a:rPr lang="en-CA" smtClean="0"/>
               <a:t>‹#›</a:t>
             </a:fld>
-            <a:endParaRPr lang="en-CA"/>
+            <a:endParaRPr lang="en-CA" dirty="0"/>
           </a:p>
         </p:txBody>
       </p:sp>
@@ -868,7 +869,7 @@
               <a:rPr lang="en-CA" smtClean="0"/>
               <a:t>2021-01-07</a:t>
             </a:fld>
-            <a:endParaRPr lang="en-CA"/>
+            <a:endParaRPr lang="en-CA" dirty="0"/>
           </a:p>
         </p:txBody>
       </p:sp>
@@ -893,7 +894,7 @@
           <a:bodyPr/>
           <a:lstStyle/>
           <a:p>
-            <a:endParaRPr lang="en-CA"/>
+            <a:endParaRPr lang="en-CA" dirty="0"/>
           </a:p>
         </p:txBody>
       </p:sp>
@@ -922,7 +923,7 @@
               <a:rPr lang="en-CA" smtClean="0"/>
               <a:t>‹#›</a:t>
             </a:fld>
-            <a:endParaRPr lang="en-CA"/>
+            <a:endParaRPr lang="en-CA" dirty="0"/>
           </a:p>
         </p:txBody>
       </p:sp>
@@ -1144,7 +1145,7 @@
               <a:rPr lang="en-CA" smtClean="0"/>
               <a:t>2021-01-07</a:t>
             </a:fld>
-            <a:endParaRPr lang="en-CA"/>
+            <a:endParaRPr lang="en-CA" dirty="0"/>
           </a:p>
         </p:txBody>
       </p:sp>
@@ -1169,7 +1170,7 @@
           <a:bodyPr/>
           <a:lstStyle/>
           <a:p>
-            <a:endParaRPr lang="en-CA"/>
+            <a:endParaRPr lang="en-CA" dirty="0"/>
           </a:p>
         </p:txBody>
       </p:sp>
@@ -1198,7 +1199,7 @@
               <a:rPr lang="en-CA" smtClean="0"/>
               <a:t>‹#›</a:t>
             </a:fld>
-            <a:endParaRPr lang="en-CA"/>
+            <a:endParaRPr lang="en-CA" dirty="0"/>
           </a:p>
         </p:txBody>
       </p:sp>
@@ -1412,7 +1413,7 @@
               <a:rPr lang="en-CA" smtClean="0"/>
               <a:t>2021-01-07</a:t>
             </a:fld>
-            <a:endParaRPr lang="en-CA"/>
+            <a:endParaRPr lang="en-CA" dirty="0"/>
           </a:p>
         </p:txBody>
       </p:sp>
@@ -1437,7 +1438,7 @@
           <a:bodyPr/>
           <a:lstStyle/>
           <a:p>
-            <a:endParaRPr lang="en-CA"/>
+            <a:endParaRPr lang="en-CA" dirty="0"/>
           </a:p>
         </p:txBody>
       </p:sp>
@@ -1466,7 +1467,7 @@
               <a:rPr lang="en-CA" smtClean="0"/>
               <a:t>‹#›</a:t>
             </a:fld>
-            <a:endParaRPr lang="en-CA"/>
+            <a:endParaRPr lang="en-CA" dirty="0"/>
           </a:p>
         </p:txBody>
       </p:sp>
@@ -1827,7 +1828,7 @@
               <a:rPr lang="en-CA" smtClean="0"/>
               <a:t>2021-01-07</a:t>
             </a:fld>
-            <a:endParaRPr lang="en-CA"/>
+            <a:endParaRPr lang="en-CA" dirty="0"/>
           </a:p>
         </p:txBody>
       </p:sp>
@@ -1852,7 +1853,7 @@
           <a:bodyPr/>
           <a:lstStyle/>
           <a:p>
-            <a:endParaRPr lang="en-CA"/>
+            <a:endParaRPr lang="en-CA" dirty="0"/>
           </a:p>
         </p:txBody>
       </p:sp>
@@ -1881,7 +1882,7 @@
               <a:rPr lang="en-CA" smtClean="0"/>
               <a:t>‹#›</a:t>
             </a:fld>
-            <a:endParaRPr lang="en-CA"/>
+            <a:endParaRPr lang="en-CA" dirty="0"/>
           </a:p>
         </p:txBody>
       </p:sp>
@@ -1969,7 +1970,7 @@
               <a:rPr lang="en-CA" smtClean="0"/>
               <a:t>2021-01-07</a:t>
             </a:fld>
-            <a:endParaRPr lang="en-CA"/>
+            <a:endParaRPr lang="en-CA" dirty="0"/>
           </a:p>
         </p:txBody>
       </p:sp>
@@ -1994,7 +1995,7 @@
           <a:bodyPr/>
           <a:lstStyle/>
           <a:p>
-            <a:endParaRPr lang="en-CA"/>
+            <a:endParaRPr lang="en-CA" dirty="0"/>
           </a:p>
         </p:txBody>
       </p:sp>
@@ -2023,7 +2024,7 @@
               <a:rPr lang="en-CA" smtClean="0"/>
               <a:t>‹#›</a:t>
             </a:fld>
-            <a:endParaRPr lang="en-CA"/>
+            <a:endParaRPr lang="en-CA" dirty="0"/>
           </a:p>
         </p:txBody>
       </p:sp>
@@ -2082,7 +2083,7 @@
               <a:rPr lang="en-CA" smtClean="0"/>
               <a:t>2021-01-07</a:t>
             </a:fld>
-            <a:endParaRPr lang="en-CA"/>
+            <a:endParaRPr lang="en-CA" dirty="0"/>
           </a:p>
         </p:txBody>
       </p:sp>
@@ -2107,7 +2108,7 @@
           <a:bodyPr/>
           <a:lstStyle/>
           <a:p>
-            <a:endParaRPr lang="en-CA"/>
+            <a:endParaRPr lang="en-CA" dirty="0"/>
           </a:p>
         </p:txBody>
       </p:sp>
@@ -2136,7 +2137,7 @@
               <a:rPr lang="en-CA" smtClean="0"/>
               <a:t>‹#›</a:t>
             </a:fld>
-            <a:endParaRPr lang="en-CA"/>
+            <a:endParaRPr lang="en-CA" dirty="0"/>
           </a:p>
         </p:txBody>
       </p:sp>
@@ -2395,7 +2396,7 @@
               <a:rPr lang="en-CA" smtClean="0"/>
               <a:t>2021-01-07</a:t>
             </a:fld>
-            <a:endParaRPr lang="en-CA"/>
+            <a:endParaRPr lang="en-CA" dirty="0"/>
           </a:p>
         </p:txBody>
       </p:sp>
@@ -2420,7 +2421,7 @@
           <a:bodyPr/>
           <a:lstStyle/>
           <a:p>
-            <a:endParaRPr lang="en-CA"/>
+            <a:endParaRPr lang="en-CA" dirty="0"/>
           </a:p>
         </p:txBody>
       </p:sp>
@@ -2449,7 +2450,7 @@
               <a:rPr lang="en-CA" smtClean="0"/>
               <a:t>‹#›</a:t>
             </a:fld>
-            <a:endParaRPr lang="en-CA"/>
+            <a:endParaRPr lang="en-CA" dirty="0"/>
           </a:p>
         </p:txBody>
       </p:sp>
@@ -2584,7 +2585,7 @@
             </a:lvl9pPr>
           </a:lstStyle>
           <a:p>
-            <a:endParaRPr lang="en-CA"/>
+            <a:endParaRPr lang="en-CA" dirty="0"/>
           </a:p>
         </p:txBody>
       </p:sp>
@@ -2684,7 +2685,7 @@
               <a:rPr lang="en-CA" smtClean="0"/>
               <a:t>2021-01-07</a:t>
             </a:fld>
-            <a:endParaRPr lang="en-CA"/>
+            <a:endParaRPr lang="en-CA" dirty="0"/>
           </a:p>
         </p:txBody>
       </p:sp>
@@ -2709,7 +2710,7 @@
           <a:bodyPr/>
           <a:lstStyle/>
           <a:p>
-            <a:endParaRPr lang="en-CA"/>
+            <a:endParaRPr lang="en-CA" dirty="0"/>
           </a:p>
         </p:txBody>
       </p:sp>
@@ -2738,7 +2739,7 @@
               <a:rPr lang="en-CA" smtClean="0"/>
               <a:t>‹#›</a:t>
             </a:fld>
-            <a:endParaRPr lang="en-CA"/>
+            <a:endParaRPr lang="en-CA" dirty="0"/>
           </a:p>
         </p:txBody>
       </p:sp>
@@ -2927,7 +2928,7 @@
               <a:rPr lang="en-CA" smtClean="0"/>
               <a:t>2021-01-07</a:t>
             </a:fld>
-            <a:endParaRPr lang="en-CA"/>
+            <a:endParaRPr lang="en-CA" dirty="0"/>
           </a:p>
         </p:txBody>
       </p:sp>
@@ -2970,7 +2971,7 @@
             </a:lvl1pPr>
           </a:lstStyle>
           <a:p>
-            <a:endParaRPr lang="en-CA"/>
+            <a:endParaRPr lang="en-CA" dirty="0"/>
           </a:p>
         </p:txBody>
       </p:sp>
@@ -3017,7 +3018,7 @@
               <a:rPr lang="en-CA" smtClean="0"/>
               <a:t>‹#›</a:t>
             </a:fld>
-            <a:endParaRPr lang="en-CA"/>
+            <a:endParaRPr lang="en-CA" dirty="0"/>
           </a:p>
         </p:txBody>
       </p:sp>
@@ -3389,7 +3390,7 @@
           <a:lstStyle/>
           <a:p>
             <a:pPr algn="ctr"/>
-            <a:endParaRPr lang="en-CA"/>
+            <a:endParaRPr lang="en-CA" dirty="0"/>
           </a:p>
         </p:txBody>
       </p:sp>
@@ -3483,7 +3484,7 @@
           <a:lstStyle/>
           <a:p>
             <a:pPr algn="ctr"/>
-            <a:endParaRPr lang="en-CA"/>
+            <a:endParaRPr lang="en-CA" dirty="0"/>
           </a:p>
         </p:txBody>
       </p:sp>
@@ -3569,7 +3570,7 @@
               <a:lstStyle/>
               <a:p>
                 <a:pPr algn="ctr"/>
-                <a:endParaRPr lang="en-CA"/>
+                <a:endParaRPr lang="en-CA" dirty="0"/>
               </a:p>
             </p:txBody>
           </p:sp>
@@ -3615,7 +3616,7 @@
               <a:lstStyle/>
               <a:p>
                 <a:pPr algn="ctr"/>
-                <a:endParaRPr lang="en-CA"/>
+                <a:endParaRPr lang="en-CA" dirty="0"/>
               </a:p>
             </p:txBody>
           </p:sp>
@@ -3661,7 +3662,7 @@
               <a:lstStyle/>
               <a:p>
                 <a:pPr algn="ctr"/>
-                <a:endParaRPr lang="en-CA"/>
+                <a:endParaRPr lang="en-CA" dirty="0"/>
               </a:p>
             </p:txBody>
           </p:sp>
@@ -3707,7 +3708,7 @@
               <a:lstStyle/>
               <a:p>
                 <a:pPr algn="ctr"/>
-                <a:endParaRPr lang="en-CA"/>
+                <a:endParaRPr lang="en-CA" dirty="0"/>
               </a:p>
             </p:txBody>
           </p:sp>
@@ -3753,7 +3754,7 @@
               <a:lstStyle/>
               <a:p>
                 <a:pPr algn="ctr"/>
-                <a:endParaRPr lang="en-CA"/>
+                <a:endParaRPr lang="en-CA" dirty="0"/>
               </a:p>
             </p:txBody>
           </p:sp>
@@ -3799,7 +3800,7 @@
               <a:lstStyle/>
               <a:p>
                 <a:pPr algn="ctr"/>
-                <a:endParaRPr lang="en-CA"/>
+                <a:endParaRPr lang="en-CA" dirty="0"/>
               </a:p>
             </p:txBody>
           </p:sp>
@@ -3845,7 +3846,7 @@
               <a:lstStyle/>
               <a:p>
                 <a:pPr algn="ctr"/>
-                <a:endParaRPr lang="en-CA"/>
+                <a:endParaRPr lang="en-CA" dirty="0"/>
               </a:p>
             </p:txBody>
           </p:sp>
@@ -3891,7 +3892,7 @@
               <a:lstStyle/>
               <a:p>
                 <a:pPr algn="ctr"/>
-                <a:endParaRPr lang="en-CA"/>
+                <a:endParaRPr lang="en-CA" dirty="0"/>
               </a:p>
             </p:txBody>
           </p:sp>
@@ -3938,7 +3939,7 @@
             <a:lstStyle/>
             <a:p>
               <a:pPr algn="ctr"/>
-              <a:endParaRPr lang="en-CA"/>
+              <a:endParaRPr lang="en-CA" dirty="0"/>
             </a:p>
           </p:txBody>
         </p:sp>
@@ -3984,7 +3985,7 @@
             <a:lstStyle/>
             <a:p>
               <a:pPr algn="ctr"/>
-              <a:endParaRPr lang="en-CA"/>
+              <a:endParaRPr lang="en-CA" dirty="0"/>
             </a:p>
           </p:txBody>
         </p:sp>
@@ -4318,6 +4319,1425 @@
 </p:sld>
 </file>
 
+<file path=ppt/slides/slide2.xml><?xml version="1.0" encoding="utf-8"?>
+<p:sld xmlns:a="http://schemas.openxmlformats.org/drawingml/2006/main" xmlns:r="http://schemas.openxmlformats.org/officeDocument/2006/relationships" xmlns:p="http://schemas.openxmlformats.org/presentationml/2006/main">
+  <p:cSld>
+    <p:spTree>
+      <p:nvGrpSpPr>
+        <p:cNvPr id="1" name=""/>
+        <p:cNvGrpSpPr/>
+        <p:nvPr/>
+      </p:nvGrpSpPr>
+      <p:grpSpPr>
+        <a:xfrm>
+          <a:off x="0" y="0"/>
+          <a:ext cx="0" cy="0"/>
+          <a:chOff x="0" y="0"/>
+          <a:chExt cx="0" cy="0"/>
+        </a:xfrm>
+      </p:grpSpPr>
+      <p:sp>
+        <p:nvSpPr>
+          <p:cNvPr id="6" name="Oval 5">
+            <a:extLst>
+              <a:ext uri="{FF2B5EF4-FFF2-40B4-BE49-F238E27FC236}">
+                <a16:creationId xmlns:a16="http://schemas.microsoft.com/office/drawing/2014/main" id="{0569BB1B-69F9-42DD-9C3D-3D628456C508}"/>
+              </a:ext>
+            </a:extLst>
+          </p:cNvPr>
+          <p:cNvSpPr/>
+          <p:nvPr/>
+        </p:nvSpPr>
+        <p:spPr>
+          <a:xfrm>
+            <a:off x="5381537" y="3217177"/>
+            <a:ext cx="159391" cy="159391"/>
+          </a:xfrm>
+          <a:prstGeom prst="ellipse">
+            <a:avLst/>
+          </a:prstGeom>
+        </p:spPr>
+        <p:style>
+          <a:lnRef idx="2">
+            <a:schemeClr val="accent4">
+              <a:shade val="50000"/>
+            </a:schemeClr>
+          </a:lnRef>
+          <a:fillRef idx="1">
+            <a:schemeClr val="accent4"/>
+          </a:fillRef>
+          <a:effectRef idx="0">
+            <a:schemeClr val="accent4"/>
+          </a:effectRef>
+          <a:fontRef idx="minor">
+            <a:schemeClr val="lt1"/>
+          </a:fontRef>
+        </p:style>
+        <p:txBody>
+          <a:bodyPr rtlCol="0" anchor="ctr"/>
+          <a:lstStyle/>
+          <a:p>
+            <a:pPr algn="ctr"/>
+            <a:endParaRPr lang="en-CA" dirty="0"/>
+          </a:p>
+        </p:txBody>
+      </p:sp>
+      <p:grpSp>
+        <p:nvGrpSpPr>
+          <p:cNvPr id="19" name="Group 18">
+            <a:extLst>
+              <a:ext uri="{FF2B5EF4-FFF2-40B4-BE49-F238E27FC236}">
+                <a16:creationId xmlns:a16="http://schemas.microsoft.com/office/drawing/2014/main" id="{87CF6B98-A122-4A6D-95B8-763A6A6A099A}"/>
+              </a:ext>
+            </a:extLst>
+          </p:cNvPr>
+          <p:cNvGrpSpPr/>
+          <p:nvPr/>
+        </p:nvGrpSpPr>
+        <p:grpSpPr>
+          <a:xfrm>
+            <a:off x="4516073" y="2429642"/>
+            <a:ext cx="1890320" cy="1728501"/>
+            <a:chOff x="4516073" y="2429642"/>
+            <a:chExt cx="1890320" cy="1728501"/>
+          </a:xfrm>
+        </p:grpSpPr>
+        <p:sp>
+          <p:nvSpPr>
+            <p:cNvPr id="4" name="Decagon 3">
+              <a:extLst>
+                <a:ext uri="{FF2B5EF4-FFF2-40B4-BE49-F238E27FC236}">
+                  <a16:creationId xmlns:a16="http://schemas.microsoft.com/office/drawing/2014/main" id="{84495157-EB25-4367-9D9B-324957D763D7}"/>
+                </a:ext>
+              </a:extLst>
+            </p:cNvPr>
+            <p:cNvSpPr/>
+            <p:nvPr/>
+          </p:nvSpPr>
+          <p:spPr>
+            <a:xfrm>
+              <a:off x="4571998" y="2485571"/>
+              <a:ext cx="1778467" cy="1616643"/>
+            </a:xfrm>
+            <a:prstGeom prst="decagon">
+              <a:avLst/>
+            </a:prstGeom>
+            <a:solidFill>
+              <a:srgbClr val="4472C4">
+                <a:alpha val="38824"/>
+              </a:srgbClr>
+            </a:solidFill>
+          </p:spPr>
+          <p:style>
+            <a:lnRef idx="2">
+              <a:schemeClr val="accent1">
+                <a:shade val="50000"/>
+              </a:schemeClr>
+            </a:lnRef>
+            <a:fillRef idx="1">
+              <a:schemeClr val="accent1"/>
+            </a:fillRef>
+            <a:effectRef idx="0">
+              <a:schemeClr val="accent1"/>
+            </a:effectRef>
+            <a:fontRef idx="minor">
+              <a:schemeClr val="lt1"/>
+            </a:fontRef>
+          </p:style>
+          <p:txBody>
+            <a:bodyPr rtlCol="0" anchor="ctr"/>
+            <a:lstStyle/>
+            <a:p>
+              <a:pPr algn="ctr"/>
+              <a:endParaRPr lang="en-CA" dirty="0"/>
+            </a:p>
+          </p:txBody>
+        </p:sp>
+        <p:grpSp>
+          <p:nvGrpSpPr>
+            <p:cNvPr id="7" name="Group 6">
+              <a:extLst>
+                <a:ext uri="{FF2B5EF4-FFF2-40B4-BE49-F238E27FC236}">
+                  <a16:creationId xmlns:a16="http://schemas.microsoft.com/office/drawing/2014/main" id="{0C991A31-D6E5-4773-9FA0-D8F6EBBDC4EC}"/>
+                </a:ext>
+              </a:extLst>
+            </p:cNvPr>
+            <p:cNvGrpSpPr/>
+            <p:nvPr/>
+          </p:nvGrpSpPr>
+          <p:grpSpPr>
+            <a:xfrm>
+              <a:off x="4516073" y="2429642"/>
+              <a:ext cx="1890320" cy="1728501"/>
+              <a:chOff x="4516073" y="2429642"/>
+              <a:chExt cx="1890320" cy="1728501"/>
+            </a:xfrm>
+          </p:grpSpPr>
+          <p:grpSp>
+            <p:nvGrpSpPr>
+              <p:cNvPr id="8" name="Group 7">
+                <a:extLst>
+                  <a:ext uri="{FF2B5EF4-FFF2-40B4-BE49-F238E27FC236}">
+                    <a16:creationId xmlns:a16="http://schemas.microsoft.com/office/drawing/2014/main" id="{7A2DA3A6-656E-45E4-87A8-AB74F85BC294}"/>
+                  </a:ext>
+                </a:extLst>
+              </p:cNvPr>
+              <p:cNvGrpSpPr/>
+              <p:nvPr/>
+            </p:nvGrpSpPr>
+            <p:grpSpPr>
+              <a:xfrm>
+                <a:off x="4516073" y="2429642"/>
+                <a:ext cx="1890320" cy="1728501"/>
+                <a:chOff x="4516073" y="2429642"/>
+                <a:chExt cx="1890320" cy="1728501"/>
+              </a:xfrm>
+            </p:grpSpPr>
+            <p:sp>
+              <p:nvSpPr>
+                <p:cNvPr id="11" name="Oval 10">
+                  <a:extLst>
+                    <a:ext uri="{FF2B5EF4-FFF2-40B4-BE49-F238E27FC236}">
+                      <a16:creationId xmlns:a16="http://schemas.microsoft.com/office/drawing/2014/main" id="{53A463AA-F785-4175-9314-FFBC5C44CC46}"/>
+                    </a:ext>
+                  </a:extLst>
+                </p:cNvPr>
+                <p:cNvSpPr/>
+                <p:nvPr/>
+              </p:nvSpPr>
+              <p:spPr>
+                <a:xfrm>
+                  <a:off x="5687734" y="2429642"/>
+                  <a:ext cx="111856" cy="111856"/>
+                </a:xfrm>
+                <a:prstGeom prst="ellipse">
+                  <a:avLst/>
+                </a:prstGeom>
+              </p:spPr>
+              <p:style>
+                <a:lnRef idx="2">
+                  <a:schemeClr val="accent1">
+                    <a:shade val="50000"/>
+                  </a:schemeClr>
+                </a:lnRef>
+                <a:fillRef idx="1">
+                  <a:schemeClr val="accent1"/>
+                </a:fillRef>
+                <a:effectRef idx="0">
+                  <a:schemeClr val="accent1"/>
+                </a:effectRef>
+                <a:fontRef idx="minor">
+                  <a:schemeClr val="lt1"/>
+                </a:fontRef>
+              </p:style>
+              <p:txBody>
+                <a:bodyPr rtlCol="0" anchor="ctr"/>
+                <a:lstStyle/>
+                <a:p>
+                  <a:pPr algn="ctr"/>
+                  <a:endParaRPr lang="en-CA" dirty="0"/>
+                </a:p>
+              </p:txBody>
+            </p:sp>
+            <p:sp>
+              <p:nvSpPr>
+                <p:cNvPr id="12" name="Oval 11">
+                  <a:extLst>
+                    <a:ext uri="{FF2B5EF4-FFF2-40B4-BE49-F238E27FC236}">
+                      <a16:creationId xmlns:a16="http://schemas.microsoft.com/office/drawing/2014/main" id="{67407E57-C81E-4B46-A455-0A52F13F84AF}"/>
+                    </a:ext>
+                  </a:extLst>
+                </p:cNvPr>
+                <p:cNvSpPr/>
+                <p:nvPr/>
+              </p:nvSpPr>
+              <p:spPr>
+                <a:xfrm>
+                  <a:off x="5101903" y="4046287"/>
+                  <a:ext cx="111856" cy="111856"/>
+                </a:xfrm>
+                <a:prstGeom prst="ellipse">
+                  <a:avLst/>
+                </a:prstGeom>
+              </p:spPr>
+              <p:style>
+                <a:lnRef idx="2">
+                  <a:schemeClr val="accent1">
+                    <a:shade val="50000"/>
+                  </a:schemeClr>
+                </a:lnRef>
+                <a:fillRef idx="1">
+                  <a:schemeClr val="accent1"/>
+                </a:fillRef>
+                <a:effectRef idx="0">
+                  <a:schemeClr val="accent1"/>
+                </a:effectRef>
+                <a:fontRef idx="minor">
+                  <a:schemeClr val="lt1"/>
+                </a:fontRef>
+              </p:style>
+              <p:txBody>
+                <a:bodyPr rtlCol="0" anchor="ctr"/>
+                <a:lstStyle/>
+                <a:p>
+                  <a:pPr algn="ctr"/>
+                  <a:endParaRPr lang="en-CA" dirty="0"/>
+                </a:p>
+              </p:txBody>
+            </p:sp>
+            <p:sp>
+              <p:nvSpPr>
+                <p:cNvPr id="13" name="Oval 12">
+                  <a:extLst>
+                    <a:ext uri="{FF2B5EF4-FFF2-40B4-BE49-F238E27FC236}">
+                      <a16:creationId xmlns:a16="http://schemas.microsoft.com/office/drawing/2014/main" id="{A0864553-5F9A-4683-94A8-6944125B188F}"/>
+                    </a:ext>
+                  </a:extLst>
+                </p:cNvPr>
+                <p:cNvSpPr/>
+                <p:nvPr/>
+              </p:nvSpPr>
+              <p:spPr>
+                <a:xfrm>
+                  <a:off x="6294537" y="3240944"/>
+                  <a:ext cx="111856" cy="111856"/>
+                </a:xfrm>
+                <a:prstGeom prst="ellipse">
+                  <a:avLst/>
+                </a:prstGeom>
+              </p:spPr>
+              <p:style>
+                <a:lnRef idx="2">
+                  <a:schemeClr val="accent1">
+                    <a:shade val="50000"/>
+                  </a:schemeClr>
+                </a:lnRef>
+                <a:fillRef idx="1">
+                  <a:schemeClr val="accent1"/>
+                </a:fillRef>
+                <a:effectRef idx="0">
+                  <a:schemeClr val="accent1"/>
+                </a:effectRef>
+                <a:fontRef idx="minor">
+                  <a:schemeClr val="lt1"/>
+                </a:fontRef>
+              </p:style>
+              <p:txBody>
+                <a:bodyPr rtlCol="0" anchor="ctr"/>
+                <a:lstStyle/>
+                <a:p>
+                  <a:pPr algn="ctr"/>
+                  <a:endParaRPr lang="en-CA" dirty="0"/>
+                </a:p>
+              </p:txBody>
+            </p:sp>
+            <p:sp>
+              <p:nvSpPr>
+                <p:cNvPr id="14" name="Oval 13">
+                  <a:extLst>
+                    <a:ext uri="{FF2B5EF4-FFF2-40B4-BE49-F238E27FC236}">
+                      <a16:creationId xmlns:a16="http://schemas.microsoft.com/office/drawing/2014/main" id="{A8F3B58C-C31F-4B90-81CC-7C2A46A90CD5}"/>
+                    </a:ext>
+                  </a:extLst>
+                </p:cNvPr>
+                <p:cNvSpPr/>
+                <p:nvPr/>
+              </p:nvSpPr>
+              <p:spPr>
+                <a:xfrm>
+                  <a:off x="4516073" y="3245837"/>
+                  <a:ext cx="111856" cy="111856"/>
+                </a:xfrm>
+                <a:prstGeom prst="ellipse">
+                  <a:avLst/>
+                </a:prstGeom>
+              </p:spPr>
+              <p:style>
+                <a:lnRef idx="2">
+                  <a:schemeClr val="accent1">
+                    <a:shade val="50000"/>
+                  </a:schemeClr>
+                </a:lnRef>
+                <a:fillRef idx="1">
+                  <a:schemeClr val="accent1"/>
+                </a:fillRef>
+                <a:effectRef idx="0">
+                  <a:schemeClr val="accent1"/>
+                </a:effectRef>
+                <a:fontRef idx="minor">
+                  <a:schemeClr val="lt1"/>
+                </a:fontRef>
+              </p:style>
+              <p:txBody>
+                <a:bodyPr rtlCol="0" anchor="ctr"/>
+                <a:lstStyle/>
+                <a:p>
+                  <a:pPr algn="ctr"/>
+                  <a:endParaRPr lang="en-CA" dirty="0"/>
+                </a:p>
+              </p:txBody>
+            </p:sp>
+            <p:sp>
+              <p:nvSpPr>
+                <p:cNvPr id="15" name="Oval 14">
+                  <a:extLst>
+                    <a:ext uri="{FF2B5EF4-FFF2-40B4-BE49-F238E27FC236}">
+                      <a16:creationId xmlns:a16="http://schemas.microsoft.com/office/drawing/2014/main" id="{7802F654-C3A4-4279-9F57-E695522C3A11}"/>
+                    </a:ext>
+                  </a:extLst>
+                </p:cNvPr>
+                <p:cNvSpPr/>
+                <p:nvPr/>
+              </p:nvSpPr>
+              <p:spPr>
+                <a:xfrm>
+                  <a:off x="6127284" y="2718612"/>
+                  <a:ext cx="111856" cy="111856"/>
+                </a:xfrm>
+                <a:prstGeom prst="ellipse">
+                  <a:avLst/>
+                </a:prstGeom>
+              </p:spPr>
+              <p:style>
+                <a:lnRef idx="2">
+                  <a:schemeClr val="accent1">
+                    <a:shade val="50000"/>
+                  </a:schemeClr>
+                </a:lnRef>
+                <a:fillRef idx="1">
+                  <a:schemeClr val="accent1"/>
+                </a:fillRef>
+                <a:effectRef idx="0">
+                  <a:schemeClr val="accent1"/>
+                </a:effectRef>
+                <a:fontRef idx="minor">
+                  <a:schemeClr val="lt1"/>
+                </a:fontRef>
+              </p:style>
+              <p:txBody>
+                <a:bodyPr rtlCol="0" anchor="ctr"/>
+                <a:lstStyle/>
+                <a:p>
+                  <a:pPr algn="ctr"/>
+                  <a:endParaRPr lang="en-CA" dirty="0"/>
+                </a:p>
+              </p:txBody>
+            </p:sp>
+            <p:sp>
+              <p:nvSpPr>
+                <p:cNvPr id="16" name="Oval 15">
+                  <a:extLst>
+                    <a:ext uri="{FF2B5EF4-FFF2-40B4-BE49-F238E27FC236}">
+                      <a16:creationId xmlns:a16="http://schemas.microsoft.com/office/drawing/2014/main" id="{1049116B-9DE6-44FD-B148-C7BF692AC390}"/>
+                    </a:ext>
+                  </a:extLst>
+                </p:cNvPr>
+                <p:cNvSpPr/>
+                <p:nvPr/>
+              </p:nvSpPr>
+              <p:spPr>
+                <a:xfrm>
+                  <a:off x="6127284" y="3741659"/>
+                  <a:ext cx="111856" cy="111856"/>
+                </a:xfrm>
+                <a:prstGeom prst="ellipse">
+                  <a:avLst/>
+                </a:prstGeom>
+              </p:spPr>
+              <p:style>
+                <a:lnRef idx="2">
+                  <a:schemeClr val="accent1">
+                    <a:shade val="50000"/>
+                  </a:schemeClr>
+                </a:lnRef>
+                <a:fillRef idx="1">
+                  <a:schemeClr val="accent1"/>
+                </a:fillRef>
+                <a:effectRef idx="0">
+                  <a:schemeClr val="accent1"/>
+                </a:effectRef>
+                <a:fontRef idx="minor">
+                  <a:schemeClr val="lt1"/>
+                </a:fontRef>
+              </p:style>
+              <p:txBody>
+                <a:bodyPr rtlCol="0" anchor="ctr"/>
+                <a:lstStyle/>
+                <a:p>
+                  <a:pPr algn="ctr"/>
+                  <a:endParaRPr lang="en-CA" dirty="0"/>
+                </a:p>
+              </p:txBody>
+            </p:sp>
+            <p:sp>
+              <p:nvSpPr>
+                <p:cNvPr id="17" name="Oval 16">
+                  <a:extLst>
+                    <a:ext uri="{FF2B5EF4-FFF2-40B4-BE49-F238E27FC236}">
+                      <a16:creationId xmlns:a16="http://schemas.microsoft.com/office/drawing/2014/main" id="{CFE3D6FA-2FE6-494C-AC67-051B81F0741A}"/>
+                    </a:ext>
+                  </a:extLst>
+                </p:cNvPr>
+                <p:cNvSpPr/>
+                <p:nvPr/>
+              </p:nvSpPr>
+              <p:spPr>
+                <a:xfrm>
+                  <a:off x="4675462" y="3741659"/>
+                  <a:ext cx="111856" cy="111856"/>
+                </a:xfrm>
+                <a:prstGeom prst="ellipse">
+                  <a:avLst/>
+                </a:prstGeom>
+              </p:spPr>
+              <p:style>
+                <a:lnRef idx="2">
+                  <a:schemeClr val="accent1">
+                    <a:shade val="50000"/>
+                  </a:schemeClr>
+                </a:lnRef>
+                <a:fillRef idx="1">
+                  <a:schemeClr val="accent1"/>
+                </a:fillRef>
+                <a:effectRef idx="0">
+                  <a:schemeClr val="accent1"/>
+                </a:effectRef>
+                <a:fontRef idx="minor">
+                  <a:schemeClr val="lt1"/>
+                </a:fontRef>
+              </p:style>
+              <p:txBody>
+                <a:bodyPr rtlCol="0" anchor="ctr"/>
+                <a:lstStyle/>
+                <a:p>
+                  <a:pPr algn="ctr"/>
+                  <a:endParaRPr lang="en-CA" dirty="0"/>
+                </a:p>
+              </p:txBody>
+            </p:sp>
+            <p:sp>
+              <p:nvSpPr>
+                <p:cNvPr id="18" name="Oval 17">
+                  <a:extLst>
+                    <a:ext uri="{FF2B5EF4-FFF2-40B4-BE49-F238E27FC236}">
+                      <a16:creationId xmlns:a16="http://schemas.microsoft.com/office/drawing/2014/main" id="{E41F215E-6143-4153-9D7A-E7BCC6E5A42F}"/>
+                    </a:ext>
+                  </a:extLst>
+                </p:cNvPr>
+                <p:cNvSpPr/>
+                <p:nvPr/>
+              </p:nvSpPr>
+              <p:spPr>
+                <a:xfrm>
+                  <a:off x="4675462" y="2718612"/>
+                  <a:ext cx="111856" cy="111856"/>
+                </a:xfrm>
+                <a:prstGeom prst="ellipse">
+                  <a:avLst/>
+                </a:prstGeom>
+              </p:spPr>
+              <p:style>
+                <a:lnRef idx="2">
+                  <a:schemeClr val="accent1">
+                    <a:shade val="50000"/>
+                  </a:schemeClr>
+                </a:lnRef>
+                <a:fillRef idx="1">
+                  <a:schemeClr val="accent1"/>
+                </a:fillRef>
+                <a:effectRef idx="0">
+                  <a:schemeClr val="accent1"/>
+                </a:effectRef>
+                <a:fontRef idx="minor">
+                  <a:schemeClr val="lt1"/>
+                </a:fontRef>
+              </p:style>
+              <p:txBody>
+                <a:bodyPr rtlCol="0" anchor="ctr"/>
+                <a:lstStyle/>
+                <a:p>
+                  <a:pPr algn="ctr"/>
+                  <a:endParaRPr lang="en-CA" dirty="0"/>
+                </a:p>
+              </p:txBody>
+            </p:sp>
+          </p:grpSp>
+          <p:sp>
+            <p:nvSpPr>
+              <p:cNvPr id="9" name="Oval 8">
+                <a:extLst>
+                  <a:ext uri="{FF2B5EF4-FFF2-40B4-BE49-F238E27FC236}">
+                    <a16:creationId xmlns:a16="http://schemas.microsoft.com/office/drawing/2014/main" id="{78561575-A35A-479B-923B-7DCB19CC9D3C}"/>
+                  </a:ext>
+                </a:extLst>
+              </p:cNvPr>
+              <p:cNvSpPr/>
+              <p:nvPr/>
+            </p:nvSpPr>
+            <p:spPr>
+              <a:xfrm>
+                <a:off x="5101903" y="2429643"/>
+                <a:ext cx="111856" cy="111856"/>
+              </a:xfrm>
+              <a:prstGeom prst="ellipse">
+                <a:avLst/>
+              </a:prstGeom>
+            </p:spPr>
+            <p:style>
+              <a:lnRef idx="2">
+                <a:schemeClr val="accent1">
+                  <a:shade val="50000"/>
+                </a:schemeClr>
+              </a:lnRef>
+              <a:fillRef idx="1">
+                <a:schemeClr val="accent1"/>
+              </a:fillRef>
+              <a:effectRef idx="0">
+                <a:schemeClr val="accent1"/>
+              </a:effectRef>
+              <a:fontRef idx="minor">
+                <a:schemeClr val="lt1"/>
+              </a:fontRef>
+            </p:style>
+            <p:txBody>
+              <a:bodyPr rtlCol="0" anchor="ctr"/>
+              <a:lstStyle/>
+              <a:p>
+                <a:pPr algn="ctr"/>
+                <a:endParaRPr lang="en-CA" dirty="0"/>
+              </a:p>
+            </p:txBody>
+          </p:sp>
+          <p:sp>
+            <p:nvSpPr>
+              <p:cNvPr id="10" name="Oval 9">
+                <a:extLst>
+                  <a:ext uri="{FF2B5EF4-FFF2-40B4-BE49-F238E27FC236}">
+                    <a16:creationId xmlns:a16="http://schemas.microsoft.com/office/drawing/2014/main" id="{3CBDFA1A-AD3E-4EDE-8AC5-F9EC25141C10}"/>
+                  </a:ext>
+                </a:extLst>
+              </p:cNvPr>
+              <p:cNvSpPr/>
+              <p:nvPr/>
+            </p:nvSpPr>
+            <p:spPr>
+              <a:xfrm>
+                <a:off x="5687734" y="4040170"/>
+                <a:ext cx="111856" cy="111856"/>
+              </a:xfrm>
+              <a:prstGeom prst="ellipse">
+                <a:avLst/>
+              </a:prstGeom>
+            </p:spPr>
+            <p:style>
+              <a:lnRef idx="2">
+                <a:schemeClr val="accent1">
+                  <a:shade val="50000"/>
+                </a:schemeClr>
+              </a:lnRef>
+              <a:fillRef idx="1">
+                <a:schemeClr val="accent1"/>
+              </a:fillRef>
+              <a:effectRef idx="0">
+                <a:schemeClr val="accent1"/>
+              </a:effectRef>
+              <a:fontRef idx="minor">
+                <a:schemeClr val="lt1"/>
+              </a:fontRef>
+            </p:style>
+            <p:txBody>
+              <a:bodyPr rtlCol="0" anchor="ctr"/>
+              <a:lstStyle/>
+              <a:p>
+                <a:pPr algn="ctr"/>
+                <a:endParaRPr lang="en-CA" dirty="0"/>
+              </a:p>
+            </p:txBody>
+          </p:sp>
+        </p:grpSp>
+      </p:grpSp>
+      <p:grpSp>
+        <p:nvGrpSpPr>
+          <p:cNvPr id="35" name="Group 34">
+            <a:extLst>
+              <a:ext uri="{FF2B5EF4-FFF2-40B4-BE49-F238E27FC236}">
+                <a16:creationId xmlns:a16="http://schemas.microsoft.com/office/drawing/2014/main" id="{24F8CCF2-5023-4B4A-9012-642A146DC590}"/>
+              </a:ext>
+            </a:extLst>
+          </p:cNvPr>
+          <p:cNvGrpSpPr/>
+          <p:nvPr/>
+        </p:nvGrpSpPr>
+        <p:grpSpPr>
+          <a:xfrm>
+            <a:off x="4717267" y="2546803"/>
+            <a:ext cx="1489433" cy="1498926"/>
+            <a:chOff x="4717267" y="2546803"/>
+            <a:chExt cx="1489433" cy="1498926"/>
+          </a:xfrm>
+        </p:grpSpPr>
+        <p:sp>
+          <p:nvSpPr>
+            <p:cNvPr id="20" name="Arrow: Down 19">
+              <a:extLst>
+                <a:ext uri="{FF2B5EF4-FFF2-40B4-BE49-F238E27FC236}">
+                  <a16:creationId xmlns:a16="http://schemas.microsoft.com/office/drawing/2014/main" id="{91851EC4-B991-40E4-A521-480F67F8B16E}"/>
+                </a:ext>
+              </a:extLst>
+            </p:cNvPr>
+            <p:cNvSpPr/>
+            <p:nvPr/>
+          </p:nvSpPr>
+          <p:spPr>
+            <a:xfrm rot="9562009">
+              <a:off x="5227070" y="2553169"/>
+              <a:ext cx="148844" cy="634206"/>
+            </a:xfrm>
+            <a:prstGeom prst="downArrow">
+              <a:avLst/>
+            </a:prstGeom>
+          </p:spPr>
+          <p:style>
+            <a:lnRef idx="2">
+              <a:schemeClr val="accent4">
+                <a:shade val="50000"/>
+              </a:schemeClr>
+            </a:lnRef>
+            <a:fillRef idx="1">
+              <a:schemeClr val="accent4"/>
+            </a:fillRef>
+            <a:effectRef idx="0">
+              <a:schemeClr val="accent4"/>
+            </a:effectRef>
+            <a:fontRef idx="minor">
+              <a:schemeClr val="lt1"/>
+            </a:fontRef>
+          </p:style>
+          <p:txBody>
+            <a:bodyPr rtlCol="0" anchor="ctr"/>
+            <a:lstStyle/>
+            <a:p>
+              <a:pPr algn="ctr"/>
+              <a:endParaRPr lang="en-CA" dirty="0"/>
+            </a:p>
+          </p:txBody>
+        </p:sp>
+        <p:grpSp>
+          <p:nvGrpSpPr>
+            <p:cNvPr id="24" name="Group 23">
+              <a:extLst>
+                <a:ext uri="{FF2B5EF4-FFF2-40B4-BE49-F238E27FC236}">
+                  <a16:creationId xmlns:a16="http://schemas.microsoft.com/office/drawing/2014/main" id="{F6468010-01B7-4A54-88B3-3CFD97F481D0}"/>
+                </a:ext>
+              </a:extLst>
+            </p:cNvPr>
+            <p:cNvGrpSpPr/>
+            <p:nvPr/>
+          </p:nvGrpSpPr>
+          <p:grpSpPr>
+            <a:xfrm rot="4559892">
+              <a:off x="5226679" y="2555033"/>
+              <a:ext cx="469105" cy="1487930"/>
+              <a:chOff x="5379470" y="2705569"/>
+              <a:chExt cx="469105" cy="1487930"/>
+            </a:xfrm>
+          </p:grpSpPr>
+          <p:sp>
+            <p:nvSpPr>
+              <p:cNvPr id="22" name="Arrow: Down 21">
+                <a:extLst>
+                  <a:ext uri="{FF2B5EF4-FFF2-40B4-BE49-F238E27FC236}">
+                    <a16:creationId xmlns:a16="http://schemas.microsoft.com/office/drawing/2014/main" id="{F91A9CC8-8EC6-4782-8BB0-80CB16A10CE7}"/>
+                  </a:ext>
+                </a:extLst>
+              </p:cNvPr>
+              <p:cNvSpPr/>
+              <p:nvPr/>
+            </p:nvSpPr>
+            <p:spPr>
+              <a:xfrm rot="9562009">
+                <a:off x="5379470" y="2705569"/>
+                <a:ext cx="148844" cy="634206"/>
+              </a:xfrm>
+              <a:prstGeom prst="downArrow">
+                <a:avLst/>
+              </a:prstGeom>
+            </p:spPr>
+            <p:style>
+              <a:lnRef idx="2">
+                <a:schemeClr val="accent4">
+                  <a:shade val="50000"/>
+                </a:schemeClr>
+              </a:lnRef>
+              <a:fillRef idx="1">
+                <a:schemeClr val="accent4"/>
+              </a:fillRef>
+              <a:effectRef idx="0">
+                <a:schemeClr val="accent4"/>
+              </a:effectRef>
+              <a:fontRef idx="minor">
+                <a:schemeClr val="lt1"/>
+              </a:fontRef>
+            </p:style>
+            <p:txBody>
+              <a:bodyPr rtlCol="0" anchor="ctr"/>
+              <a:lstStyle/>
+              <a:p>
+                <a:pPr algn="ctr"/>
+                <a:endParaRPr lang="en-CA" dirty="0"/>
+              </a:p>
+            </p:txBody>
+          </p:sp>
+          <p:sp>
+            <p:nvSpPr>
+              <p:cNvPr id="23" name="Arrow: Down 22">
+                <a:extLst>
+                  <a:ext uri="{FF2B5EF4-FFF2-40B4-BE49-F238E27FC236}">
+                    <a16:creationId xmlns:a16="http://schemas.microsoft.com/office/drawing/2014/main" id="{0ED3D3BC-E17C-4164-8197-6A62A52BE447}"/>
+                  </a:ext>
+                </a:extLst>
+              </p:cNvPr>
+              <p:cNvSpPr/>
+              <p:nvPr/>
+            </p:nvSpPr>
+            <p:spPr>
+              <a:xfrm rot="20406984">
+                <a:off x="5699731" y="3559293"/>
+                <a:ext cx="148844" cy="634206"/>
+              </a:xfrm>
+              <a:prstGeom prst="downArrow">
+                <a:avLst/>
+              </a:prstGeom>
+            </p:spPr>
+            <p:style>
+              <a:lnRef idx="2">
+                <a:schemeClr val="accent4">
+                  <a:shade val="50000"/>
+                </a:schemeClr>
+              </a:lnRef>
+              <a:fillRef idx="1">
+                <a:schemeClr val="accent4"/>
+              </a:fillRef>
+              <a:effectRef idx="0">
+                <a:schemeClr val="accent4"/>
+              </a:effectRef>
+              <a:fontRef idx="minor">
+                <a:schemeClr val="lt1"/>
+              </a:fontRef>
+            </p:style>
+            <p:txBody>
+              <a:bodyPr rtlCol="0" anchor="ctr"/>
+              <a:lstStyle/>
+              <a:p>
+                <a:pPr algn="ctr"/>
+                <a:endParaRPr lang="en-CA" dirty="0"/>
+              </a:p>
+            </p:txBody>
+          </p:sp>
+        </p:grpSp>
+        <p:grpSp>
+          <p:nvGrpSpPr>
+            <p:cNvPr id="34" name="Group 33">
+              <a:extLst>
+                <a:ext uri="{FF2B5EF4-FFF2-40B4-BE49-F238E27FC236}">
+                  <a16:creationId xmlns:a16="http://schemas.microsoft.com/office/drawing/2014/main" id="{D92F931F-9A86-4F9D-9EB6-BFA494D6B168}"/>
+                </a:ext>
+              </a:extLst>
+            </p:cNvPr>
+            <p:cNvGrpSpPr/>
+            <p:nvPr/>
+          </p:nvGrpSpPr>
+          <p:grpSpPr>
+            <a:xfrm>
+              <a:off x="4718770" y="2546803"/>
+              <a:ext cx="1487930" cy="1498926"/>
+              <a:chOff x="4718770" y="2546803"/>
+              <a:chExt cx="1487930" cy="1498926"/>
+            </a:xfrm>
+          </p:grpSpPr>
+          <p:sp>
+            <p:nvSpPr>
+              <p:cNvPr id="21" name="Arrow: Down 20">
+                <a:extLst>
+                  <a:ext uri="{FF2B5EF4-FFF2-40B4-BE49-F238E27FC236}">
+                    <a16:creationId xmlns:a16="http://schemas.microsoft.com/office/drawing/2014/main" id="{DC294DD2-8BFC-4136-B0AF-1F26E2A52926}"/>
+                  </a:ext>
+                </a:extLst>
+              </p:cNvPr>
+              <p:cNvSpPr/>
+              <p:nvPr/>
+            </p:nvSpPr>
+            <p:spPr>
+              <a:xfrm rot="20406984">
+                <a:off x="5547331" y="3406893"/>
+                <a:ext cx="148844" cy="634206"/>
+              </a:xfrm>
+              <a:prstGeom prst="downArrow">
+                <a:avLst/>
+              </a:prstGeom>
+            </p:spPr>
+            <p:style>
+              <a:lnRef idx="2">
+                <a:schemeClr val="accent4">
+                  <a:shade val="50000"/>
+                </a:schemeClr>
+              </a:lnRef>
+              <a:fillRef idx="1">
+                <a:schemeClr val="accent4"/>
+              </a:fillRef>
+              <a:effectRef idx="0">
+                <a:schemeClr val="accent4"/>
+              </a:effectRef>
+              <a:fontRef idx="minor">
+                <a:schemeClr val="lt1"/>
+              </a:fontRef>
+            </p:style>
+            <p:txBody>
+              <a:bodyPr rtlCol="0" anchor="ctr"/>
+              <a:lstStyle/>
+              <a:p>
+                <a:pPr algn="ctr"/>
+                <a:endParaRPr lang="en-CA" dirty="0"/>
+              </a:p>
+            </p:txBody>
+          </p:sp>
+          <p:grpSp>
+            <p:nvGrpSpPr>
+              <p:cNvPr id="27" name="Group 26">
+                <a:extLst>
+                  <a:ext uri="{FF2B5EF4-FFF2-40B4-BE49-F238E27FC236}">
+                    <a16:creationId xmlns:a16="http://schemas.microsoft.com/office/drawing/2014/main" id="{F447BB9D-648D-43CC-9516-4F8A4642EBA1}"/>
+                  </a:ext>
+                </a:extLst>
+              </p:cNvPr>
+              <p:cNvGrpSpPr/>
+              <p:nvPr/>
+            </p:nvGrpSpPr>
+            <p:grpSpPr>
+              <a:xfrm rot="8747885">
+                <a:off x="5231307" y="2546803"/>
+                <a:ext cx="469105" cy="1487930"/>
+                <a:chOff x="5379470" y="2705569"/>
+                <a:chExt cx="469105" cy="1487930"/>
+              </a:xfrm>
+            </p:grpSpPr>
+            <p:sp>
+              <p:nvSpPr>
+                <p:cNvPr id="25" name="Arrow: Down 24">
+                  <a:extLst>
+                    <a:ext uri="{FF2B5EF4-FFF2-40B4-BE49-F238E27FC236}">
+                      <a16:creationId xmlns:a16="http://schemas.microsoft.com/office/drawing/2014/main" id="{E53D21D8-3B43-4FFE-ACF1-4DD5F48FF889}"/>
+                    </a:ext>
+                  </a:extLst>
+                </p:cNvPr>
+                <p:cNvSpPr/>
+                <p:nvPr/>
+              </p:nvSpPr>
+              <p:spPr>
+                <a:xfrm rot="9562009">
+                  <a:off x="5379470" y="2705569"/>
+                  <a:ext cx="148844" cy="634206"/>
+                </a:xfrm>
+                <a:prstGeom prst="downArrow">
+                  <a:avLst/>
+                </a:prstGeom>
+              </p:spPr>
+              <p:style>
+                <a:lnRef idx="2">
+                  <a:schemeClr val="accent4">
+                    <a:shade val="50000"/>
+                  </a:schemeClr>
+                </a:lnRef>
+                <a:fillRef idx="1">
+                  <a:schemeClr val="accent4"/>
+                </a:fillRef>
+                <a:effectRef idx="0">
+                  <a:schemeClr val="accent4"/>
+                </a:effectRef>
+                <a:fontRef idx="minor">
+                  <a:schemeClr val="lt1"/>
+                </a:fontRef>
+              </p:style>
+              <p:txBody>
+                <a:bodyPr rtlCol="0" anchor="ctr"/>
+                <a:lstStyle/>
+                <a:p>
+                  <a:pPr algn="ctr"/>
+                  <a:endParaRPr lang="en-CA" dirty="0"/>
+                </a:p>
+              </p:txBody>
+            </p:sp>
+            <p:sp>
+              <p:nvSpPr>
+                <p:cNvPr id="26" name="Arrow: Down 25">
+                  <a:extLst>
+                    <a:ext uri="{FF2B5EF4-FFF2-40B4-BE49-F238E27FC236}">
+                      <a16:creationId xmlns:a16="http://schemas.microsoft.com/office/drawing/2014/main" id="{55A0BF7F-C218-42B0-B904-4D26B5908174}"/>
+                    </a:ext>
+                  </a:extLst>
+                </p:cNvPr>
+                <p:cNvSpPr/>
+                <p:nvPr/>
+              </p:nvSpPr>
+              <p:spPr>
+                <a:xfrm rot="20406984">
+                  <a:off x="5699731" y="3559293"/>
+                  <a:ext cx="148844" cy="634206"/>
+                </a:xfrm>
+                <a:prstGeom prst="downArrow">
+                  <a:avLst/>
+                </a:prstGeom>
+              </p:spPr>
+              <p:style>
+                <a:lnRef idx="2">
+                  <a:schemeClr val="accent4">
+                    <a:shade val="50000"/>
+                  </a:schemeClr>
+                </a:lnRef>
+                <a:fillRef idx="1">
+                  <a:schemeClr val="accent4"/>
+                </a:fillRef>
+                <a:effectRef idx="0">
+                  <a:schemeClr val="accent4"/>
+                </a:effectRef>
+                <a:fontRef idx="minor">
+                  <a:schemeClr val="lt1"/>
+                </a:fontRef>
+              </p:style>
+              <p:txBody>
+                <a:bodyPr rtlCol="0" anchor="ctr"/>
+                <a:lstStyle/>
+                <a:p>
+                  <a:pPr algn="ctr"/>
+                  <a:endParaRPr lang="en-CA" dirty="0"/>
+                </a:p>
+              </p:txBody>
+            </p:sp>
+          </p:grpSp>
+          <p:grpSp>
+            <p:nvGrpSpPr>
+              <p:cNvPr id="28" name="Group 27">
+                <a:extLst>
+                  <a:ext uri="{FF2B5EF4-FFF2-40B4-BE49-F238E27FC236}">
+                    <a16:creationId xmlns:a16="http://schemas.microsoft.com/office/drawing/2014/main" id="{E049AC41-29C0-4D4C-9D3F-9E5BF4582614}"/>
+                  </a:ext>
+                </a:extLst>
+              </p:cNvPr>
+              <p:cNvGrpSpPr/>
+              <p:nvPr/>
+            </p:nvGrpSpPr>
+            <p:grpSpPr>
+              <a:xfrm rot="2422850">
+                <a:off x="5226679" y="2557799"/>
+                <a:ext cx="469105" cy="1487930"/>
+                <a:chOff x="5379470" y="2705569"/>
+                <a:chExt cx="469105" cy="1487930"/>
+              </a:xfrm>
+            </p:grpSpPr>
+            <p:sp>
+              <p:nvSpPr>
+                <p:cNvPr id="29" name="Arrow: Down 28">
+                  <a:extLst>
+                    <a:ext uri="{FF2B5EF4-FFF2-40B4-BE49-F238E27FC236}">
+                      <a16:creationId xmlns:a16="http://schemas.microsoft.com/office/drawing/2014/main" id="{7A403268-7137-411E-A249-86A647750AE6}"/>
+                    </a:ext>
+                  </a:extLst>
+                </p:cNvPr>
+                <p:cNvSpPr/>
+                <p:nvPr/>
+              </p:nvSpPr>
+              <p:spPr>
+                <a:xfrm rot="9562009">
+                  <a:off x="5379470" y="2705569"/>
+                  <a:ext cx="148844" cy="634206"/>
+                </a:xfrm>
+                <a:prstGeom prst="downArrow">
+                  <a:avLst/>
+                </a:prstGeom>
+              </p:spPr>
+              <p:style>
+                <a:lnRef idx="2">
+                  <a:schemeClr val="accent4">
+                    <a:shade val="50000"/>
+                  </a:schemeClr>
+                </a:lnRef>
+                <a:fillRef idx="1">
+                  <a:schemeClr val="accent4"/>
+                </a:fillRef>
+                <a:effectRef idx="0">
+                  <a:schemeClr val="accent4"/>
+                </a:effectRef>
+                <a:fontRef idx="minor">
+                  <a:schemeClr val="lt1"/>
+                </a:fontRef>
+              </p:style>
+              <p:txBody>
+                <a:bodyPr rtlCol="0" anchor="ctr"/>
+                <a:lstStyle/>
+                <a:p>
+                  <a:pPr algn="ctr"/>
+                  <a:endParaRPr lang="en-CA" dirty="0"/>
+                </a:p>
+              </p:txBody>
+            </p:sp>
+            <p:sp>
+              <p:nvSpPr>
+                <p:cNvPr id="30" name="Arrow: Down 29">
+                  <a:extLst>
+                    <a:ext uri="{FF2B5EF4-FFF2-40B4-BE49-F238E27FC236}">
+                      <a16:creationId xmlns:a16="http://schemas.microsoft.com/office/drawing/2014/main" id="{386425DA-F886-46E5-A2E9-C64D5592B8C0}"/>
+                    </a:ext>
+                  </a:extLst>
+                </p:cNvPr>
+                <p:cNvSpPr/>
+                <p:nvPr/>
+              </p:nvSpPr>
+              <p:spPr>
+                <a:xfrm rot="20406984">
+                  <a:off x="5699731" y="3559293"/>
+                  <a:ext cx="148844" cy="634206"/>
+                </a:xfrm>
+                <a:prstGeom prst="downArrow">
+                  <a:avLst/>
+                </a:prstGeom>
+              </p:spPr>
+              <p:style>
+                <a:lnRef idx="2">
+                  <a:schemeClr val="accent4">
+                    <a:shade val="50000"/>
+                  </a:schemeClr>
+                </a:lnRef>
+                <a:fillRef idx="1">
+                  <a:schemeClr val="accent4"/>
+                </a:fillRef>
+                <a:effectRef idx="0">
+                  <a:schemeClr val="accent4"/>
+                </a:effectRef>
+                <a:fontRef idx="minor">
+                  <a:schemeClr val="lt1"/>
+                </a:fontRef>
+              </p:style>
+              <p:txBody>
+                <a:bodyPr rtlCol="0" anchor="ctr"/>
+                <a:lstStyle/>
+                <a:p>
+                  <a:pPr algn="ctr"/>
+                  <a:endParaRPr lang="en-CA" dirty="0"/>
+                </a:p>
+              </p:txBody>
+            </p:sp>
+          </p:grpSp>
+          <p:grpSp>
+            <p:nvGrpSpPr>
+              <p:cNvPr id="31" name="Group 30">
+                <a:extLst>
+                  <a:ext uri="{FF2B5EF4-FFF2-40B4-BE49-F238E27FC236}">
+                    <a16:creationId xmlns:a16="http://schemas.microsoft.com/office/drawing/2014/main" id="{18A0E5E2-1A29-401B-8CAD-AE40334F50E6}"/>
+                  </a:ext>
+                </a:extLst>
+              </p:cNvPr>
+              <p:cNvGrpSpPr/>
+              <p:nvPr/>
+            </p:nvGrpSpPr>
+            <p:grpSpPr>
+              <a:xfrm rot="6639287">
+                <a:off x="5228182" y="2544316"/>
+                <a:ext cx="469105" cy="1487930"/>
+                <a:chOff x="5379470" y="2705569"/>
+                <a:chExt cx="469105" cy="1487930"/>
+              </a:xfrm>
+            </p:grpSpPr>
+            <p:sp>
+              <p:nvSpPr>
+                <p:cNvPr id="32" name="Arrow: Down 31">
+                  <a:extLst>
+                    <a:ext uri="{FF2B5EF4-FFF2-40B4-BE49-F238E27FC236}">
+                      <a16:creationId xmlns:a16="http://schemas.microsoft.com/office/drawing/2014/main" id="{67BEF1FF-AB88-42E2-94CA-EA59D6A54A0E}"/>
+                    </a:ext>
+                  </a:extLst>
+                </p:cNvPr>
+                <p:cNvSpPr/>
+                <p:nvPr/>
+              </p:nvSpPr>
+              <p:spPr>
+                <a:xfrm rot="9562009">
+                  <a:off x="5379470" y="2705569"/>
+                  <a:ext cx="148844" cy="634206"/>
+                </a:xfrm>
+                <a:prstGeom prst="downArrow">
+                  <a:avLst/>
+                </a:prstGeom>
+              </p:spPr>
+              <p:style>
+                <a:lnRef idx="2">
+                  <a:schemeClr val="accent4">
+                    <a:shade val="50000"/>
+                  </a:schemeClr>
+                </a:lnRef>
+                <a:fillRef idx="1">
+                  <a:schemeClr val="accent4"/>
+                </a:fillRef>
+                <a:effectRef idx="0">
+                  <a:schemeClr val="accent4"/>
+                </a:effectRef>
+                <a:fontRef idx="minor">
+                  <a:schemeClr val="lt1"/>
+                </a:fontRef>
+              </p:style>
+              <p:txBody>
+                <a:bodyPr rtlCol="0" anchor="ctr"/>
+                <a:lstStyle/>
+                <a:p>
+                  <a:pPr algn="ctr"/>
+                  <a:endParaRPr lang="en-CA" dirty="0"/>
+                </a:p>
+              </p:txBody>
+            </p:sp>
+            <p:sp>
+              <p:nvSpPr>
+                <p:cNvPr id="33" name="Arrow: Down 32">
+                  <a:extLst>
+                    <a:ext uri="{FF2B5EF4-FFF2-40B4-BE49-F238E27FC236}">
+                      <a16:creationId xmlns:a16="http://schemas.microsoft.com/office/drawing/2014/main" id="{DC112F54-E4C9-43DB-9078-9B2C32FD802B}"/>
+                    </a:ext>
+                  </a:extLst>
+                </p:cNvPr>
+                <p:cNvSpPr/>
+                <p:nvPr/>
+              </p:nvSpPr>
+              <p:spPr>
+                <a:xfrm rot="20406984">
+                  <a:off x="5699731" y="3559293"/>
+                  <a:ext cx="148844" cy="634206"/>
+                </a:xfrm>
+                <a:prstGeom prst="downArrow">
+                  <a:avLst/>
+                </a:prstGeom>
+              </p:spPr>
+              <p:style>
+                <a:lnRef idx="2">
+                  <a:schemeClr val="accent4">
+                    <a:shade val="50000"/>
+                  </a:schemeClr>
+                </a:lnRef>
+                <a:fillRef idx="1">
+                  <a:schemeClr val="accent4"/>
+                </a:fillRef>
+                <a:effectRef idx="0">
+                  <a:schemeClr val="accent4"/>
+                </a:effectRef>
+                <a:fontRef idx="minor">
+                  <a:schemeClr val="lt1"/>
+                </a:fontRef>
+              </p:style>
+              <p:txBody>
+                <a:bodyPr rtlCol="0" anchor="ctr"/>
+                <a:lstStyle/>
+                <a:p>
+                  <a:pPr algn="ctr"/>
+                  <a:endParaRPr lang="en-CA" dirty="0"/>
+                </a:p>
+              </p:txBody>
+            </p:sp>
+          </p:grpSp>
+        </p:grpSp>
+      </p:grpSp>
+    </p:spTree>
+    <p:extLst>
+      <p:ext uri="{BB962C8B-B14F-4D97-AF65-F5344CB8AC3E}">
+        <p14:creationId xmlns:p14="http://schemas.microsoft.com/office/powerpoint/2010/main" val="1970096088"/>
+      </p:ext>
+    </p:extLst>
+  </p:cSld>
+  <p:clrMapOvr>
+    <a:masterClrMapping/>
+  </p:clrMapOvr>
+  <p:timing>
+    <p:tnLst>
+      <p:par>
+        <p:cTn id="1" dur="indefinite" restart="never" nodeType="tmRoot">
+          <p:childTnLst>
+            <p:seq concurrent="1" nextAc="seek">
+              <p:cTn id="2" dur="indefinite" nodeType="mainSeq">
+                <p:childTnLst>
+                  <p:par>
+                    <p:cTn id="3" fill="hold">
+                      <p:stCondLst>
+                        <p:cond delay="indefinite"/>
+                      </p:stCondLst>
+                      <p:childTnLst>
+                        <p:par>
+                          <p:cTn id="4" fill="hold">
+                            <p:stCondLst>
+                              <p:cond delay="0"/>
+                            </p:stCondLst>
+                            <p:childTnLst>
+                              <p:par>
+                                <p:cTn id="5" presetID="53" presetClass="entr" presetSubtype="16" fill="hold" nodeType="clickEffect">
+                                  <p:stCondLst>
+                                    <p:cond delay="0"/>
+                                  </p:stCondLst>
+                                  <p:childTnLst>
+                                    <p:set>
+                                      <p:cBhvr>
+                                        <p:cTn id="6" dur="1" fill="hold">
+                                          <p:stCondLst>
+                                            <p:cond delay="0"/>
+                                          </p:stCondLst>
+                                        </p:cTn>
+                                        <p:tgtEl>
+                                          <p:spTgt spid="35"/>
+                                        </p:tgtEl>
+                                        <p:attrNameLst>
+                                          <p:attrName>style.visibility</p:attrName>
+                                        </p:attrNameLst>
+                                      </p:cBhvr>
+                                      <p:to>
+                                        <p:strVal val="visible"/>
+                                      </p:to>
+                                    </p:set>
+                                    <p:anim calcmode="lin" valueType="num">
+                                      <p:cBhvr>
+                                        <p:cTn id="7" dur="500" fill="hold"/>
+                                        <p:tgtEl>
+                                          <p:spTgt spid="35"/>
+                                        </p:tgtEl>
+                                        <p:attrNameLst>
+                                          <p:attrName>ppt_w</p:attrName>
+                                        </p:attrNameLst>
+                                      </p:cBhvr>
+                                      <p:tavLst>
+                                        <p:tav tm="0">
+                                          <p:val>
+                                            <p:fltVal val="0"/>
+                                          </p:val>
+                                        </p:tav>
+                                        <p:tav tm="100000">
+                                          <p:val>
+                                            <p:strVal val="#ppt_w"/>
+                                          </p:val>
+                                        </p:tav>
+                                      </p:tavLst>
+                                    </p:anim>
+                                    <p:anim calcmode="lin" valueType="num">
+                                      <p:cBhvr>
+                                        <p:cTn id="8" dur="500" fill="hold"/>
+                                        <p:tgtEl>
+                                          <p:spTgt spid="35"/>
+                                        </p:tgtEl>
+                                        <p:attrNameLst>
+                                          <p:attrName>ppt_h</p:attrName>
+                                        </p:attrNameLst>
+                                      </p:cBhvr>
+                                      <p:tavLst>
+                                        <p:tav tm="0">
+                                          <p:val>
+                                            <p:fltVal val="0"/>
+                                          </p:val>
+                                        </p:tav>
+                                        <p:tav tm="100000">
+                                          <p:val>
+                                            <p:strVal val="#ppt_h"/>
+                                          </p:val>
+                                        </p:tav>
+                                      </p:tavLst>
+                                    </p:anim>
+                                    <p:animEffect transition="in" filter="fade">
+                                      <p:cBhvr>
+                                        <p:cTn id="9" dur="500"/>
+                                        <p:tgtEl>
+                                          <p:spTgt spid="35"/>
+                                        </p:tgtEl>
+                                      </p:cBhvr>
+                                    </p:animEffect>
+                                  </p:childTnLst>
+                                </p:cTn>
+                              </p:par>
+                            </p:childTnLst>
+                          </p:cTn>
+                        </p:par>
+                      </p:childTnLst>
+                    </p:cTn>
+                  </p:par>
+                  <p:par>
+                    <p:cTn id="10" fill="hold">
+                      <p:stCondLst>
+                        <p:cond delay="indefinite"/>
+                      </p:stCondLst>
+                      <p:childTnLst>
+                        <p:par>
+                          <p:cTn id="11" fill="hold">
+                            <p:stCondLst>
+                              <p:cond delay="0"/>
+                            </p:stCondLst>
+                            <p:childTnLst>
+                              <p:par>
+                                <p:cTn id="12" presetID="6" presetClass="emph" presetSubtype="0" fill="hold" nodeType="clickEffect">
+                                  <p:stCondLst>
+                                    <p:cond delay="0"/>
+                                  </p:stCondLst>
+                                  <p:childTnLst>
+                                    <p:animScale>
+                                      <p:cBhvr>
+                                        <p:cTn id="13" dur="2000" fill="hold"/>
+                                        <p:tgtEl>
+                                          <p:spTgt spid="19"/>
+                                        </p:tgtEl>
+                                      </p:cBhvr>
+                                      <p:by x="150000" y="150000"/>
+                                    </p:animScale>
+                                  </p:childTnLst>
+                                </p:cTn>
+                              </p:par>
+                              <p:par>
+                                <p:cTn id="14" presetID="6" presetClass="emph" presetSubtype="0" fill="hold" nodeType="withEffect">
+                                  <p:stCondLst>
+                                    <p:cond delay="0"/>
+                                  </p:stCondLst>
+                                  <p:childTnLst>
+                                    <p:animScale>
+                                      <p:cBhvr>
+                                        <p:cTn id="15" dur="2000" fill="hold"/>
+                                        <p:tgtEl>
+                                          <p:spTgt spid="35"/>
+                                        </p:tgtEl>
+                                      </p:cBhvr>
+                                      <p:by x="150000" y="150000"/>
+                                    </p:animScale>
+                                  </p:childTnLst>
+                                </p:cTn>
+                              </p:par>
+                            </p:childTnLst>
+                          </p:cTn>
+                        </p:par>
+                      </p:childTnLst>
+                    </p:cTn>
+                  </p:par>
+                </p:childTnLst>
+              </p:cTn>
+              <p:prevCondLst>
+                <p:cond evt="onPrev" delay="0">
+                  <p:tgtEl>
+                    <p:sldTgt/>
+                  </p:tgtEl>
+                </p:cond>
+              </p:prevCondLst>
+              <p:nextCondLst>
+                <p:cond evt="onNext" delay="0">
+                  <p:tgtEl>
+                    <p:sldTgt/>
+                  </p:tgtEl>
+                </p:cond>
+              </p:nextCondLst>
+            </p:seq>
+          </p:childTnLst>
+        </p:cTn>
+      </p:par>
+    </p:tnLst>
+  </p:timing>
+</p:sld>
+</file>
+
 <file path=ppt/theme/theme1.xml><?xml version="1.0" encoding="utf-8"?>
 <a:theme xmlns:a="http://schemas.openxmlformats.org/drawingml/2006/main" name="Office Theme">
   <a:themeElements>

</xml_diff>

<commit_message>
Added the terminatiojn picture.
</commit_message>
<xml_diff>
--- a/docs/Algorithm.pptx
+++ b/docs/Algorithm.pptx
@@ -7,6 +7,7 @@
   <p:sldIdLst>
     <p:sldId id="256" r:id="rId2"/>
     <p:sldId id="257" r:id="rId3"/>
+    <p:sldId id="258" r:id="rId4"/>
   </p:sldIdLst>
   <p:sldSz cx="12192000" cy="6858000"/>
   <p:notesSz cx="6858000" cy="9144000"/>
@@ -5738,6 +5739,922 @@
 </p:sld>
 </file>
 
+<file path=ppt/slides/slide3.xml><?xml version="1.0" encoding="utf-8"?>
+<p:sld xmlns:a="http://schemas.openxmlformats.org/drawingml/2006/main" xmlns:r="http://schemas.openxmlformats.org/officeDocument/2006/relationships" xmlns:p="http://schemas.openxmlformats.org/presentationml/2006/main">
+  <p:cSld>
+    <p:spTree>
+      <p:nvGrpSpPr>
+        <p:cNvPr id="1" name=""/>
+        <p:cNvGrpSpPr/>
+        <p:nvPr/>
+      </p:nvGrpSpPr>
+      <p:grpSpPr>
+        <a:xfrm>
+          <a:off x="0" y="0"/>
+          <a:ext cx="0" cy="0"/>
+          <a:chOff x="0" y="0"/>
+          <a:chExt cx="0" cy="0"/>
+        </a:xfrm>
+      </p:grpSpPr>
+      <p:sp>
+        <p:nvSpPr>
+          <p:cNvPr id="10" name="Oval 9">
+            <a:extLst>
+              <a:ext uri="{FF2B5EF4-FFF2-40B4-BE49-F238E27FC236}">
+                <a16:creationId xmlns:a16="http://schemas.microsoft.com/office/drawing/2014/main" id="{77529DAD-96A4-4A5D-9B11-28BCD3711411}"/>
+              </a:ext>
+            </a:extLst>
+          </p:cNvPr>
+          <p:cNvSpPr/>
+          <p:nvPr/>
+        </p:nvSpPr>
+        <p:spPr>
+          <a:xfrm>
+            <a:off x="5992534" y="3315467"/>
+            <a:ext cx="111856" cy="111856"/>
+          </a:xfrm>
+          <a:prstGeom prst="ellipse">
+            <a:avLst/>
+          </a:prstGeom>
+        </p:spPr>
+        <p:style>
+          <a:lnRef idx="2">
+            <a:schemeClr val="accent1">
+              <a:shade val="50000"/>
+            </a:schemeClr>
+          </a:lnRef>
+          <a:fillRef idx="1">
+            <a:schemeClr val="accent1"/>
+          </a:fillRef>
+          <a:effectRef idx="0">
+            <a:schemeClr val="accent1"/>
+          </a:effectRef>
+          <a:fontRef idx="minor">
+            <a:schemeClr val="lt1"/>
+          </a:fontRef>
+        </p:style>
+        <p:txBody>
+          <a:bodyPr rtlCol="0" anchor="ctr"/>
+          <a:lstStyle/>
+          <a:p>
+            <a:pPr algn="ctr"/>
+            <a:endParaRPr lang="en-CA" dirty="0"/>
+          </a:p>
+        </p:txBody>
+      </p:sp>
+      <p:sp>
+        <p:nvSpPr>
+          <p:cNvPr id="12" name="Oval 11">
+            <a:extLst>
+              <a:ext uri="{FF2B5EF4-FFF2-40B4-BE49-F238E27FC236}">
+                <a16:creationId xmlns:a16="http://schemas.microsoft.com/office/drawing/2014/main" id="{725E2C80-E833-4D9B-9BE4-ED28DF81F365}"/>
+              </a:ext>
+            </a:extLst>
+          </p:cNvPr>
+          <p:cNvSpPr/>
+          <p:nvPr/>
+        </p:nvSpPr>
+        <p:spPr>
+          <a:xfrm>
+            <a:off x="6599337" y="4126769"/>
+            <a:ext cx="111856" cy="111856"/>
+          </a:xfrm>
+          <a:prstGeom prst="ellipse">
+            <a:avLst/>
+          </a:prstGeom>
+        </p:spPr>
+        <p:style>
+          <a:lnRef idx="2">
+            <a:schemeClr val="accent1">
+              <a:shade val="50000"/>
+            </a:schemeClr>
+          </a:lnRef>
+          <a:fillRef idx="1">
+            <a:schemeClr val="accent1"/>
+          </a:fillRef>
+          <a:effectRef idx="0">
+            <a:schemeClr val="accent1"/>
+          </a:effectRef>
+          <a:fontRef idx="minor">
+            <a:schemeClr val="lt1"/>
+          </a:fontRef>
+        </p:style>
+        <p:txBody>
+          <a:bodyPr rtlCol="0" anchor="ctr"/>
+          <a:lstStyle/>
+          <a:p>
+            <a:pPr algn="ctr"/>
+            <a:endParaRPr lang="en-CA" dirty="0"/>
+          </a:p>
+        </p:txBody>
+      </p:sp>
+      <p:sp>
+        <p:nvSpPr>
+          <p:cNvPr id="14" name="Oval 13">
+            <a:extLst>
+              <a:ext uri="{FF2B5EF4-FFF2-40B4-BE49-F238E27FC236}">
+                <a16:creationId xmlns:a16="http://schemas.microsoft.com/office/drawing/2014/main" id="{423582E4-71A9-4AA7-A12B-87E79B1D35DE}"/>
+              </a:ext>
+            </a:extLst>
+          </p:cNvPr>
+          <p:cNvSpPr/>
+          <p:nvPr/>
+        </p:nvSpPr>
+        <p:spPr>
+          <a:xfrm>
+            <a:off x="6432084" y="3604437"/>
+            <a:ext cx="111856" cy="111856"/>
+          </a:xfrm>
+          <a:prstGeom prst="ellipse">
+            <a:avLst/>
+          </a:prstGeom>
+        </p:spPr>
+        <p:style>
+          <a:lnRef idx="2">
+            <a:schemeClr val="accent1">
+              <a:shade val="50000"/>
+            </a:schemeClr>
+          </a:lnRef>
+          <a:fillRef idx="1">
+            <a:schemeClr val="accent1"/>
+          </a:fillRef>
+          <a:effectRef idx="0">
+            <a:schemeClr val="accent1"/>
+          </a:effectRef>
+          <a:fontRef idx="minor">
+            <a:schemeClr val="lt1"/>
+          </a:fontRef>
+        </p:style>
+        <p:txBody>
+          <a:bodyPr rtlCol="0" anchor="ctr"/>
+          <a:lstStyle/>
+          <a:p>
+            <a:pPr algn="ctr"/>
+            <a:endParaRPr lang="en-CA" dirty="0"/>
+          </a:p>
+        </p:txBody>
+      </p:sp>
+      <p:sp>
+        <p:nvSpPr>
+          <p:cNvPr id="18" name="Oval 17">
+            <a:extLst>
+              <a:ext uri="{FF2B5EF4-FFF2-40B4-BE49-F238E27FC236}">
+                <a16:creationId xmlns:a16="http://schemas.microsoft.com/office/drawing/2014/main" id="{55B5EE05-6199-4E63-B11B-9ECD653CB7F6}"/>
+              </a:ext>
+            </a:extLst>
+          </p:cNvPr>
+          <p:cNvSpPr/>
+          <p:nvPr/>
+        </p:nvSpPr>
+        <p:spPr>
+          <a:xfrm>
+            <a:off x="5686337" y="4103002"/>
+            <a:ext cx="159391" cy="159391"/>
+          </a:xfrm>
+          <a:prstGeom prst="ellipse">
+            <a:avLst/>
+          </a:prstGeom>
+        </p:spPr>
+        <p:style>
+          <a:lnRef idx="2">
+            <a:schemeClr val="accent4">
+              <a:shade val="50000"/>
+            </a:schemeClr>
+          </a:lnRef>
+          <a:fillRef idx="1">
+            <a:schemeClr val="accent4"/>
+          </a:fillRef>
+          <a:effectRef idx="0">
+            <a:schemeClr val="accent4"/>
+          </a:effectRef>
+          <a:fontRef idx="minor">
+            <a:schemeClr val="lt1"/>
+          </a:fontRef>
+        </p:style>
+        <p:txBody>
+          <a:bodyPr rtlCol="0" anchor="ctr"/>
+          <a:lstStyle/>
+          <a:p>
+            <a:pPr algn="ctr"/>
+            <a:endParaRPr lang="en-CA" dirty="0"/>
+          </a:p>
+        </p:txBody>
+      </p:sp>
+      <p:cxnSp>
+        <p:nvCxnSpPr>
+          <p:cNvPr id="20" name="Straight Connector 19">
+            <a:extLst>
+              <a:ext uri="{FF2B5EF4-FFF2-40B4-BE49-F238E27FC236}">
+                <a16:creationId xmlns:a16="http://schemas.microsoft.com/office/drawing/2014/main" id="{44F4BE7C-CF52-4E5B-B48B-9E6466859535}"/>
+              </a:ext>
+            </a:extLst>
+          </p:cNvPr>
+          <p:cNvCxnSpPr>
+            <a:cxnSpLocks/>
+            <a:stCxn id="10" idx="5"/>
+            <a:endCxn id="14" idx="1"/>
+          </p:cNvCxnSpPr>
+          <p:nvPr/>
+        </p:nvCxnSpPr>
+        <p:spPr>
+          <a:xfrm>
+            <a:off x="6088009" y="3410942"/>
+            <a:ext cx="360456" cy="209876"/>
+          </a:xfrm>
+          <a:prstGeom prst="line">
+            <a:avLst/>
+          </a:prstGeom>
+        </p:spPr>
+        <p:style>
+          <a:lnRef idx="1">
+            <a:schemeClr val="accent1"/>
+          </a:lnRef>
+          <a:fillRef idx="0">
+            <a:schemeClr val="accent1"/>
+          </a:fillRef>
+          <a:effectRef idx="0">
+            <a:schemeClr val="accent1"/>
+          </a:effectRef>
+          <a:fontRef idx="minor">
+            <a:schemeClr val="tx1"/>
+          </a:fontRef>
+        </p:style>
+      </p:cxnSp>
+      <p:cxnSp>
+        <p:nvCxnSpPr>
+          <p:cNvPr id="23" name="Straight Connector 22">
+            <a:extLst>
+              <a:ext uri="{FF2B5EF4-FFF2-40B4-BE49-F238E27FC236}">
+                <a16:creationId xmlns:a16="http://schemas.microsoft.com/office/drawing/2014/main" id="{457233D4-1752-4664-BA6C-12C92626EA9A}"/>
+              </a:ext>
+            </a:extLst>
+          </p:cNvPr>
+          <p:cNvCxnSpPr>
+            <a:cxnSpLocks/>
+            <a:stCxn id="14" idx="5"/>
+            <a:endCxn id="12" idx="0"/>
+          </p:cNvCxnSpPr>
+          <p:nvPr/>
+        </p:nvCxnSpPr>
+        <p:spPr>
+          <a:xfrm>
+            <a:off x="6527559" y="3699912"/>
+            <a:ext cx="127706" cy="426857"/>
+          </a:xfrm>
+          <a:prstGeom prst="line">
+            <a:avLst/>
+          </a:prstGeom>
+        </p:spPr>
+        <p:style>
+          <a:lnRef idx="1">
+            <a:schemeClr val="accent1"/>
+          </a:lnRef>
+          <a:fillRef idx="0">
+            <a:schemeClr val="accent1"/>
+          </a:fillRef>
+          <a:effectRef idx="0">
+            <a:schemeClr val="accent1"/>
+          </a:effectRef>
+          <a:fontRef idx="minor">
+            <a:schemeClr val="tx1"/>
+          </a:fontRef>
+        </p:style>
+      </p:cxnSp>
+      <p:sp>
+        <p:nvSpPr>
+          <p:cNvPr id="68" name="Rectangle 67">
+            <a:extLst>
+              <a:ext uri="{FF2B5EF4-FFF2-40B4-BE49-F238E27FC236}">
+                <a16:creationId xmlns:a16="http://schemas.microsoft.com/office/drawing/2014/main" id="{CBFCDF88-3D24-427E-9330-4C0EF2C0C5FC}"/>
+              </a:ext>
+            </a:extLst>
+          </p:cNvPr>
+          <p:cNvSpPr/>
+          <p:nvPr/>
+        </p:nvSpPr>
+        <p:spPr>
+          <a:xfrm>
+            <a:off x="5330634" y="3124118"/>
+            <a:ext cx="1030187" cy="159391"/>
+          </a:xfrm>
+          <a:prstGeom prst="rect">
+            <a:avLst/>
+          </a:prstGeom>
+        </p:spPr>
+        <p:style>
+          <a:lnRef idx="2">
+            <a:schemeClr val="dk1">
+              <a:shade val="50000"/>
+            </a:schemeClr>
+          </a:lnRef>
+          <a:fillRef idx="1">
+            <a:schemeClr val="dk1"/>
+          </a:fillRef>
+          <a:effectRef idx="0">
+            <a:schemeClr val="dk1"/>
+          </a:effectRef>
+          <a:fontRef idx="minor">
+            <a:schemeClr val="lt1"/>
+          </a:fontRef>
+        </p:style>
+        <p:txBody>
+          <a:bodyPr rtlCol="0" anchor="ctr"/>
+          <a:lstStyle/>
+          <a:p>
+            <a:pPr algn="ctr"/>
+            <a:endParaRPr lang="en-CA"/>
+          </a:p>
+        </p:txBody>
+      </p:sp>
+      <p:sp>
+        <p:nvSpPr>
+          <p:cNvPr id="69" name="Rectangle 68">
+            <a:extLst>
+              <a:ext uri="{FF2B5EF4-FFF2-40B4-BE49-F238E27FC236}">
+                <a16:creationId xmlns:a16="http://schemas.microsoft.com/office/drawing/2014/main" id="{55073E56-9698-4E58-BD36-A4026D9C22B7}"/>
+              </a:ext>
+            </a:extLst>
+          </p:cNvPr>
+          <p:cNvSpPr/>
+          <p:nvPr/>
+        </p:nvSpPr>
+        <p:spPr>
+          <a:xfrm rot="5400000">
+            <a:off x="6338211" y="4303361"/>
+            <a:ext cx="939432" cy="159391"/>
+          </a:xfrm>
+          <a:prstGeom prst="rect">
+            <a:avLst/>
+          </a:prstGeom>
+        </p:spPr>
+        <p:style>
+          <a:lnRef idx="2">
+            <a:schemeClr val="dk1">
+              <a:shade val="50000"/>
+            </a:schemeClr>
+          </a:lnRef>
+          <a:fillRef idx="1">
+            <a:schemeClr val="dk1"/>
+          </a:fillRef>
+          <a:effectRef idx="0">
+            <a:schemeClr val="dk1"/>
+          </a:effectRef>
+          <a:fontRef idx="minor">
+            <a:schemeClr val="lt1"/>
+          </a:fontRef>
+        </p:style>
+        <p:txBody>
+          <a:bodyPr rtlCol="0" anchor="ctr"/>
+          <a:lstStyle/>
+          <a:p>
+            <a:pPr algn="ctr"/>
+            <a:endParaRPr lang="en-CA"/>
+          </a:p>
+        </p:txBody>
+      </p:sp>
+      <p:sp>
+        <p:nvSpPr>
+          <p:cNvPr id="70" name="Rectangle 69">
+            <a:extLst>
+              <a:ext uri="{FF2B5EF4-FFF2-40B4-BE49-F238E27FC236}">
+                <a16:creationId xmlns:a16="http://schemas.microsoft.com/office/drawing/2014/main" id="{2E84481E-05F3-435E-8723-CC00380F6F77}"/>
+              </a:ext>
+            </a:extLst>
+          </p:cNvPr>
+          <p:cNvSpPr/>
+          <p:nvPr/>
+        </p:nvSpPr>
+        <p:spPr>
+          <a:xfrm rot="3693905">
+            <a:off x="6344195" y="3233058"/>
+            <a:ext cx="1030187" cy="159391"/>
+          </a:xfrm>
+          <a:prstGeom prst="rect">
+            <a:avLst/>
+          </a:prstGeom>
+        </p:spPr>
+        <p:style>
+          <a:lnRef idx="2">
+            <a:schemeClr val="dk1">
+              <a:shade val="50000"/>
+            </a:schemeClr>
+          </a:lnRef>
+          <a:fillRef idx="1">
+            <a:schemeClr val="dk1"/>
+          </a:fillRef>
+          <a:effectRef idx="0">
+            <a:schemeClr val="dk1"/>
+          </a:effectRef>
+          <a:fontRef idx="minor">
+            <a:schemeClr val="lt1"/>
+          </a:fontRef>
+        </p:style>
+        <p:txBody>
+          <a:bodyPr rtlCol="0" anchor="ctr"/>
+          <a:lstStyle/>
+          <a:p>
+            <a:pPr algn="ctr"/>
+            <a:endParaRPr lang="en-CA"/>
+          </a:p>
+        </p:txBody>
+      </p:sp>
+      <p:cxnSp>
+        <p:nvCxnSpPr>
+          <p:cNvPr id="78" name="Straight Connector 77">
+            <a:extLst>
+              <a:ext uri="{FF2B5EF4-FFF2-40B4-BE49-F238E27FC236}">
+                <a16:creationId xmlns:a16="http://schemas.microsoft.com/office/drawing/2014/main" id="{20596D14-8860-47DA-91DD-D47D800242FC}"/>
+              </a:ext>
+            </a:extLst>
+          </p:cNvPr>
+          <p:cNvCxnSpPr>
+            <a:cxnSpLocks/>
+            <a:stCxn id="10" idx="5"/>
+          </p:cNvCxnSpPr>
+          <p:nvPr/>
+        </p:nvCxnSpPr>
+        <p:spPr>
+          <a:xfrm>
+            <a:off x="6088009" y="3410942"/>
+            <a:ext cx="640222" cy="48339"/>
+          </a:xfrm>
+          <a:prstGeom prst="line">
+            <a:avLst/>
+          </a:prstGeom>
+        </p:spPr>
+        <p:style>
+          <a:lnRef idx="1">
+            <a:schemeClr val="accent1"/>
+          </a:lnRef>
+          <a:fillRef idx="0">
+            <a:schemeClr val="accent1"/>
+          </a:fillRef>
+          <a:effectRef idx="0">
+            <a:schemeClr val="accent1"/>
+          </a:effectRef>
+          <a:fontRef idx="minor">
+            <a:schemeClr val="tx1"/>
+          </a:fontRef>
+        </p:style>
+      </p:cxnSp>
+      <p:cxnSp>
+        <p:nvCxnSpPr>
+          <p:cNvPr id="81" name="Straight Connector 80">
+            <a:extLst>
+              <a:ext uri="{FF2B5EF4-FFF2-40B4-BE49-F238E27FC236}">
+                <a16:creationId xmlns:a16="http://schemas.microsoft.com/office/drawing/2014/main" id="{03307B9A-6AF9-495D-A257-D6D0EDF47A58}"/>
+              </a:ext>
+            </a:extLst>
+          </p:cNvPr>
+          <p:cNvCxnSpPr>
+            <a:cxnSpLocks/>
+            <a:endCxn id="12" idx="0"/>
+          </p:cNvCxnSpPr>
+          <p:nvPr/>
+        </p:nvCxnSpPr>
+        <p:spPr>
+          <a:xfrm flipH="1">
+            <a:off x="6655265" y="3554756"/>
+            <a:ext cx="137275" cy="572013"/>
+          </a:xfrm>
+          <a:prstGeom prst="line">
+            <a:avLst/>
+          </a:prstGeom>
+        </p:spPr>
+        <p:style>
+          <a:lnRef idx="1">
+            <a:schemeClr val="accent1"/>
+          </a:lnRef>
+          <a:fillRef idx="0">
+            <a:schemeClr val="accent1"/>
+          </a:fillRef>
+          <a:effectRef idx="0">
+            <a:schemeClr val="accent1"/>
+          </a:effectRef>
+          <a:fontRef idx="minor">
+            <a:schemeClr val="tx1"/>
+          </a:fontRef>
+        </p:style>
+      </p:cxnSp>
+    </p:spTree>
+    <p:extLst>
+      <p:ext uri="{BB962C8B-B14F-4D97-AF65-F5344CB8AC3E}">
+        <p14:creationId xmlns:p14="http://schemas.microsoft.com/office/powerpoint/2010/main" val="3089260163"/>
+      </p:ext>
+    </p:extLst>
+  </p:cSld>
+  <p:clrMapOvr>
+    <a:masterClrMapping/>
+  </p:clrMapOvr>
+  <p:timing>
+    <p:tnLst>
+      <p:par>
+        <p:cTn id="1" dur="indefinite" restart="never" nodeType="tmRoot">
+          <p:childTnLst>
+            <p:seq concurrent="1" nextAc="seek">
+              <p:cTn id="2" dur="indefinite" nodeType="mainSeq">
+                <p:childTnLst>
+                  <p:par>
+                    <p:cTn id="3" fill="hold">
+                      <p:stCondLst>
+                        <p:cond delay="indefinite"/>
+                      </p:stCondLst>
+                      <p:childTnLst>
+                        <p:par>
+                          <p:cTn id="4" fill="hold">
+                            <p:stCondLst>
+                              <p:cond delay="0"/>
+                            </p:stCondLst>
+                            <p:childTnLst>
+                              <p:par>
+                                <p:cTn id="5" presetID="42" presetClass="path" presetSubtype="0" accel="50000" decel="50000" fill="hold" grpId="0" nodeType="clickEffect">
+                                  <p:stCondLst>
+                                    <p:cond delay="0"/>
+                                  </p:stCondLst>
+                                  <p:childTnLst>
+                                    <p:animMotion origin="layout" path="M -1.45833E-6 3.7037E-6 L 0.025 -0.02431 " pathEditMode="relative" rAng="0" ptsTypes="AA">
+                                      <p:cBhvr>
+                                        <p:cTn id="6" dur="2000" fill="hold"/>
+                                        <p:tgtEl>
+                                          <p:spTgt spid="14"/>
+                                        </p:tgtEl>
+                                        <p:attrNameLst>
+                                          <p:attrName>ppt_x</p:attrName>
+                                          <p:attrName>ppt_y</p:attrName>
+                                        </p:attrNameLst>
+                                      </p:cBhvr>
+                                      <p:rCtr x="1250" y="-1227"/>
+                                    </p:animMotion>
+                                  </p:childTnLst>
+                                </p:cTn>
+                              </p:par>
+                              <p:par>
+                                <p:cTn id="7" presetID="53" presetClass="exit" presetSubtype="32" fill="hold" nodeType="withEffect">
+                                  <p:stCondLst>
+                                    <p:cond delay="0"/>
+                                  </p:stCondLst>
+                                  <p:childTnLst>
+                                    <p:anim calcmode="lin" valueType="num">
+                                      <p:cBhvr>
+                                        <p:cTn id="8" dur="500"/>
+                                        <p:tgtEl>
+                                          <p:spTgt spid="20"/>
+                                        </p:tgtEl>
+                                        <p:attrNameLst>
+                                          <p:attrName>ppt_w</p:attrName>
+                                        </p:attrNameLst>
+                                      </p:cBhvr>
+                                      <p:tavLst>
+                                        <p:tav tm="0">
+                                          <p:val>
+                                            <p:strVal val="ppt_w"/>
+                                          </p:val>
+                                        </p:tav>
+                                        <p:tav tm="100000">
+                                          <p:val>
+                                            <p:fltVal val="0"/>
+                                          </p:val>
+                                        </p:tav>
+                                      </p:tavLst>
+                                    </p:anim>
+                                    <p:anim calcmode="lin" valueType="num">
+                                      <p:cBhvr>
+                                        <p:cTn id="9" dur="500"/>
+                                        <p:tgtEl>
+                                          <p:spTgt spid="20"/>
+                                        </p:tgtEl>
+                                        <p:attrNameLst>
+                                          <p:attrName>ppt_h</p:attrName>
+                                        </p:attrNameLst>
+                                      </p:cBhvr>
+                                      <p:tavLst>
+                                        <p:tav tm="0">
+                                          <p:val>
+                                            <p:strVal val="ppt_h"/>
+                                          </p:val>
+                                        </p:tav>
+                                        <p:tav tm="100000">
+                                          <p:val>
+                                            <p:fltVal val="0"/>
+                                          </p:val>
+                                        </p:tav>
+                                      </p:tavLst>
+                                    </p:anim>
+                                    <p:animEffect transition="out" filter="fade">
+                                      <p:cBhvr>
+                                        <p:cTn id="10" dur="500"/>
+                                        <p:tgtEl>
+                                          <p:spTgt spid="20"/>
+                                        </p:tgtEl>
+                                      </p:cBhvr>
+                                    </p:animEffect>
+                                    <p:set>
+                                      <p:cBhvr>
+                                        <p:cTn id="11" dur="1" fill="hold">
+                                          <p:stCondLst>
+                                            <p:cond delay="499"/>
+                                          </p:stCondLst>
+                                        </p:cTn>
+                                        <p:tgtEl>
+                                          <p:spTgt spid="20"/>
+                                        </p:tgtEl>
+                                        <p:attrNameLst>
+                                          <p:attrName>style.visibility</p:attrName>
+                                        </p:attrNameLst>
+                                      </p:cBhvr>
+                                      <p:to>
+                                        <p:strVal val="hidden"/>
+                                      </p:to>
+                                    </p:set>
+                                  </p:childTnLst>
+                                </p:cTn>
+                              </p:par>
+                              <p:par>
+                                <p:cTn id="12" presetID="53" presetClass="exit" presetSubtype="32" fill="hold" nodeType="withEffect">
+                                  <p:stCondLst>
+                                    <p:cond delay="0"/>
+                                  </p:stCondLst>
+                                  <p:childTnLst>
+                                    <p:anim calcmode="lin" valueType="num">
+                                      <p:cBhvr>
+                                        <p:cTn id="13" dur="500"/>
+                                        <p:tgtEl>
+                                          <p:spTgt spid="23"/>
+                                        </p:tgtEl>
+                                        <p:attrNameLst>
+                                          <p:attrName>ppt_w</p:attrName>
+                                        </p:attrNameLst>
+                                      </p:cBhvr>
+                                      <p:tavLst>
+                                        <p:tav tm="0">
+                                          <p:val>
+                                            <p:strVal val="ppt_w"/>
+                                          </p:val>
+                                        </p:tav>
+                                        <p:tav tm="100000">
+                                          <p:val>
+                                            <p:fltVal val="0"/>
+                                          </p:val>
+                                        </p:tav>
+                                      </p:tavLst>
+                                    </p:anim>
+                                    <p:anim calcmode="lin" valueType="num">
+                                      <p:cBhvr>
+                                        <p:cTn id="14" dur="500"/>
+                                        <p:tgtEl>
+                                          <p:spTgt spid="23"/>
+                                        </p:tgtEl>
+                                        <p:attrNameLst>
+                                          <p:attrName>ppt_h</p:attrName>
+                                        </p:attrNameLst>
+                                      </p:cBhvr>
+                                      <p:tavLst>
+                                        <p:tav tm="0">
+                                          <p:val>
+                                            <p:strVal val="ppt_h"/>
+                                          </p:val>
+                                        </p:tav>
+                                        <p:tav tm="100000">
+                                          <p:val>
+                                            <p:fltVal val="0"/>
+                                          </p:val>
+                                        </p:tav>
+                                      </p:tavLst>
+                                    </p:anim>
+                                    <p:animEffect transition="out" filter="fade">
+                                      <p:cBhvr>
+                                        <p:cTn id="15" dur="500"/>
+                                        <p:tgtEl>
+                                          <p:spTgt spid="23"/>
+                                        </p:tgtEl>
+                                      </p:cBhvr>
+                                    </p:animEffect>
+                                    <p:set>
+                                      <p:cBhvr>
+                                        <p:cTn id="16" dur="1" fill="hold">
+                                          <p:stCondLst>
+                                            <p:cond delay="499"/>
+                                          </p:stCondLst>
+                                        </p:cTn>
+                                        <p:tgtEl>
+                                          <p:spTgt spid="23"/>
+                                        </p:tgtEl>
+                                        <p:attrNameLst>
+                                          <p:attrName>style.visibility</p:attrName>
+                                        </p:attrNameLst>
+                                      </p:cBhvr>
+                                      <p:to>
+                                        <p:strVal val="hidden"/>
+                                      </p:to>
+                                    </p:set>
+                                  </p:childTnLst>
+                                </p:cTn>
+                              </p:par>
+                            </p:childTnLst>
+                          </p:cTn>
+                        </p:par>
+                        <p:par>
+                          <p:cTn id="17" fill="hold">
+                            <p:stCondLst>
+                              <p:cond delay="2000"/>
+                            </p:stCondLst>
+                            <p:childTnLst>
+                              <p:par>
+                                <p:cTn id="18" presetID="53" presetClass="entr" presetSubtype="16" fill="hold" nodeType="afterEffect">
+                                  <p:stCondLst>
+                                    <p:cond delay="0"/>
+                                  </p:stCondLst>
+                                  <p:childTnLst>
+                                    <p:set>
+                                      <p:cBhvr>
+                                        <p:cTn id="19" dur="1" fill="hold">
+                                          <p:stCondLst>
+                                            <p:cond delay="0"/>
+                                          </p:stCondLst>
+                                        </p:cTn>
+                                        <p:tgtEl>
+                                          <p:spTgt spid="78"/>
+                                        </p:tgtEl>
+                                        <p:attrNameLst>
+                                          <p:attrName>style.visibility</p:attrName>
+                                        </p:attrNameLst>
+                                      </p:cBhvr>
+                                      <p:to>
+                                        <p:strVal val="visible"/>
+                                      </p:to>
+                                    </p:set>
+                                    <p:anim calcmode="lin" valueType="num">
+                                      <p:cBhvr>
+                                        <p:cTn id="20" dur="500" fill="hold"/>
+                                        <p:tgtEl>
+                                          <p:spTgt spid="78"/>
+                                        </p:tgtEl>
+                                        <p:attrNameLst>
+                                          <p:attrName>ppt_w</p:attrName>
+                                        </p:attrNameLst>
+                                      </p:cBhvr>
+                                      <p:tavLst>
+                                        <p:tav tm="0">
+                                          <p:val>
+                                            <p:fltVal val="0"/>
+                                          </p:val>
+                                        </p:tav>
+                                        <p:tav tm="100000">
+                                          <p:val>
+                                            <p:strVal val="#ppt_w"/>
+                                          </p:val>
+                                        </p:tav>
+                                      </p:tavLst>
+                                    </p:anim>
+                                    <p:anim calcmode="lin" valueType="num">
+                                      <p:cBhvr>
+                                        <p:cTn id="21" dur="500" fill="hold"/>
+                                        <p:tgtEl>
+                                          <p:spTgt spid="78"/>
+                                        </p:tgtEl>
+                                        <p:attrNameLst>
+                                          <p:attrName>ppt_h</p:attrName>
+                                        </p:attrNameLst>
+                                      </p:cBhvr>
+                                      <p:tavLst>
+                                        <p:tav tm="0">
+                                          <p:val>
+                                            <p:fltVal val="0"/>
+                                          </p:val>
+                                        </p:tav>
+                                        <p:tav tm="100000">
+                                          <p:val>
+                                            <p:strVal val="#ppt_h"/>
+                                          </p:val>
+                                        </p:tav>
+                                      </p:tavLst>
+                                    </p:anim>
+                                    <p:animEffect transition="in" filter="fade">
+                                      <p:cBhvr>
+                                        <p:cTn id="22" dur="500"/>
+                                        <p:tgtEl>
+                                          <p:spTgt spid="78"/>
+                                        </p:tgtEl>
+                                      </p:cBhvr>
+                                    </p:animEffect>
+                                  </p:childTnLst>
+                                </p:cTn>
+                              </p:par>
+                              <p:par>
+                                <p:cTn id="23" presetID="53" presetClass="entr" presetSubtype="16" fill="hold" nodeType="withEffect">
+                                  <p:stCondLst>
+                                    <p:cond delay="0"/>
+                                  </p:stCondLst>
+                                  <p:childTnLst>
+                                    <p:set>
+                                      <p:cBhvr>
+                                        <p:cTn id="24" dur="1" fill="hold">
+                                          <p:stCondLst>
+                                            <p:cond delay="0"/>
+                                          </p:stCondLst>
+                                        </p:cTn>
+                                        <p:tgtEl>
+                                          <p:spTgt spid="81"/>
+                                        </p:tgtEl>
+                                        <p:attrNameLst>
+                                          <p:attrName>style.visibility</p:attrName>
+                                        </p:attrNameLst>
+                                      </p:cBhvr>
+                                      <p:to>
+                                        <p:strVal val="visible"/>
+                                      </p:to>
+                                    </p:set>
+                                    <p:anim calcmode="lin" valueType="num">
+                                      <p:cBhvr>
+                                        <p:cTn id="25" dur="500" fill="hold"/>
+                                        <p:tgtEl>
+                                          <p:spTgt spid="81"/>
+                                        </p:tgtEl>
+                                        <p:attrNameLst>
+                                          <p:attrName>ppt_w</p:attrName>
+                                        </p:attrNameLst>
+                                      </p:cBhvr>
+                                      <p:tavLst>
+                                        <p:tav tm="0">
+                                          <p:val>
+                                            <p:fltVal val="0"/>
+                                          </p:val>
+                                        </p:tav>
+                                        <p:tav tm="100000">
+                                          <p:val>
+                                            <p:strVal val="#ppt_w"/>
+                                          </p:val>
+                                        </p:tav>
+                                      </p:tavLst>
+                                    </p:anim>
+                                    <p:anim calcmode="lin" valueType="num">
+                                      <p:cBhvr>
+                                        <p:cTn id="26" dur="500" fill="hold"/>
+                                        <p:tgtEl>
+                                          <p:spTgt spid="81"/>
+                                        </p:tgtEl>
+                                        <p:attrNameLst>
+                                          <p:attrName>ppt_h</p:attrName>
+                                        </p:attrNameLst>
+                                      </p:cBhvr>
+                                      <p:tavLst>
+                                        <p:tav tm="0">
+                                          <p:val>
+                                            <p:fltVal val="0"/>
+                                          </p:val>
+                                        </p:tav>
+                                        <p:tav tm="100000">
+                                          <p:val>
+                                            <p:strVal val="#ppt_h"/>
+                                          </p:val>
+                                        </p:tav>
+                                      </p:tavLst>
+                                    </p:anim>
+                                    <p:animEffect transition="in" filter="fade">
+                                      <p:cBhvr>
+                                        <p:cTn id="27" dur="500"/>
+                                        <p:tgtEl>
+                                          <p:spTgt spid="81"/>
+                                        </p:tgtEl>
+                                      </p:cBhvr>
+                                    </p:animEffect>
+                                  </p:childTnLst>
+                                </p:cTn>
+                              </p:par>
+                            </p:childTnLst>
+                          </p:cTn>
+                        </p:par>
+                      </p:childTnLst>
+                    </p:cTn>
+                  </p:par>
+                </p:childTnLst>
+              </p:cTn>
+              <p:prevCondLst>
+                <p:cond evt="onPrev" delay="0">
+                  <p:tgtEl>
+                    <p:sldTgt/>
+                  </p:tgtEl>
+                </p:cond>
+              </p:prevCondLst>
+              <p:nextCondLst>
+                <p:cond evt="onNext" delay="0">
+                  <p:tgtEl>
+                    <p:sldTgt/>
+                  </p:tgtEl>
+                </p:cond>
+              </p:nextCondLst>
+            </p:seq>
+          </p:childTnLst>
+        </p:cTn>
+      </p:par>
+    </p:tnLst>
+    <p:bldLst>
+      <p:bldP spid="14" grpId="0" animBg="1"/>
+    </p:bldLst>
+  </p:timing>
+</p:sld>
+</file>
+
 <file path=ppt/theme/theme1.xml><?xml version="1.0" encoding="utf-8"?>
 <a:theme xmlns:a="http://schemas.openxmlformats.org/drawingml/2006/main" name="Office Theme">
   <a:themeElements>

</xml_diff>

<commit_message>
Improved the initialization picture.
</commit_message>
<xml_diff>
--- a/docs/Algorithm.pptx
+++ b/docs/Algorithm.pptx
@@ -106,6 +106,11 @@
       </a:defRPr>
     </a:lvl9pPr>
   </p:defaultTextStyle>
+  <p:extLst>
+    <p:ext uri="{EFAFB233-063F-42B5-8137-9DF3F51BA10A}">
+      <p15:sldGuideLst xmlns:p15="http://schemas.microsoft.com/office/powerpoint/2012/main"/>
+    </p:ext>
+  </p:extLst>
 </p:presentation>
 </file>
 
@@ -258,7 +263,7 @@
           <a:p>
             <a:fld id="{D67185DF-FACB-4C4E-8ED8-13F448A7ED0D}" type="datetimeFigureOut">
               <a:rPr lang="en-CA" smtClean="0"/>
-              <a:t>2021-01-07</a:t>
+              <a:t>2021-01-08</a:t>
             </a:fld>
             <a:endParaRPr lang="en-CA" dirty="0"/>
           </a:p>
@@ -458,7 +463,7 @@
           <a:p>
             <a:fld id="{D67185DF-FACB-4C4E-8ED8-13F448A7ED0D}" type="datetimeFigureOut">
               <a:rPr lang="en-CA" smtClean="0"/>
-              <a:t>2021-01-07</a:t>
+              <a:t>2021-01-08</a:t>
             </a:fld>
             <a:endParaRPr lang="en-CA" dirty="0"/>
           </a:p>
@@ -668,7 +673,7 @@
           <a:p>
             <a:fld id="{D67185DF-FACB-4C4E-8ED8-13F448A7ED0D}" type="datetimeFigureOut">
               <a:rPr lang="en-CA" smtClean="0"/>
-              <a:t>2021-01-07</a:t>
+              <a:t>2021-01-08</a:t>
             </a:fld>
             <a:endParaRPr lang="en-CA" dirty="0"/>
           </a:p>
@@ -868,7 +873,7 @@
           <a:p>
             <a:fld id="{D67185DF-FACB-4C4E-8ED8-13F448A7ED0D}" type="datetimeFigureOut">
               <a:rPr lang="en-CA" smtClean="0"/>
-              <a:t>2021-01-07</a:t>
+              <a:t>2021-01-08</a:t>
             </a:fld>
             <a:endParaRPr lang="en-CA" dirty="0"/>
           </a:p>
@@ -1144,7 +1149,7 @@
           <a:p>
             <a:fld id="{D67185DF-FACB-4C4E-8ED8-13F448A7ED0D}" type="datetimeFigureOut">
               <a:rPr lang="en-CA" smtClean="0"/>
-              <a:t>2021-01-07</a:t>
+              <a:t>2021-01-08</a:t>
             </a:fld>
             <a:endParaRPr lang="en-CA" dirty="0"/>
           </a:p>
@@ -1412,7 +1417,7 @@
           <a:p>
             <a:fld id="{D67185DF-FACB-4C4E-8ED8-13F448A7ED0D}" type="datetimeFigureOut">
               <a:rPr lang="en-CA" smtClean="0"/>
-              <a:t>2021-01-07</a:t>
+              <a:t>2021-01-08</a:t>
             </a:fld>
             <a:endParaRPr lang="en-CA" dirty="0"/>
           </a:p>
@@ -1827,7 +1832,7 @@
           <a:p>
             <a:fld id="{D67185DF-FACB-4C4E-8ED8-13F448A7ED0D}" type="datetimeFigureOut">
               <a:rPr lang="en-CA" smtClean="0"/>
-              <a:t>2021-01-07</a:t>
+              <a:t>2021-01-08</a:t>
             </a:fld>
             <a:endParaRPr lang="en-CA" dirty="0"/>
           </a:p>
@@ -1969,7 +1974,7 @@
           <a:p>
             <a:fld id="{D67185DF-FACB-4C4E-8ED8-13F448A7ED0D}" type="datetimeFigureOut">
               <a:rPr lang="en-CA" smtClean="0"/>
-              <a:t>2021-01-07</a:t>
+              <a:t>2021-01-08</a:t>
             </a:fld>
             <a:endParaRPr lang="en-CA" dirty="0"/>
           </a:p>
@@ -2082,7 +2087,7 @@
           <a:p>
             <a:fld id="{D67185DF-FACB-4C4E-8ED8-13F448A7ED0D}" type="datetimeFigureOut">
               <a:rPr lang="en-CA" smtClean="0"/>
-              <a:t>2021-01-07</a:t>
+              <a:t>2021-01-08</a:t>
             </a:fld>
             <a:endParaRPr lang="en-CA" dirty="0"/>
           </a:p>
@@ -2395,7 +2400,7 @@
           <a:p>
             <a:fld id="{D67185DF-FACB-4C4E-8ED8-13F448A7ED0D}" type="datetimeFigureOut">
               <a:rPr lang="en-CA" smtClean="0"/>
-              <a:t>2021-01-07</a:t>
+              <a:t>2021-01-08</a:t>
             </a:fld>
             <a:endParaRPr lang="en-CA" dirty="0"/>
           </a:p>
@@ -2684,7 +2689,7 @@
           <a:p>
             <a:fld id="{D67185DF-FACB-4C4E-8ED8-13F448A7ED0D}" type="datetimeFigureOut">
               <a:rPr lang="en-CA" smtClean="0"/>
-              <a:t>2021-01-07</a:t>
+              <a:t>2021-01-08</a:t>
             </a:fld>
             <a:endParaRPr lang="en-CA" dirty="0"/>
           </a:p>
@@ -2927,7 +2932,7 @@
           <a:p>
             <a:fld id="{D67185DF-FACB-4C4E-8ED8-13F448A7ED0D}" type="datetimeFigureOut">
               <a:rPr lang="en-CA" smtClean="0"/>
-              <a:t>2021-01-07</a:t>
+              <a:t>2021-01-08</a:t>
             </a:fld>
             <a:endParaRPr lang="en-CA" dirty="0"/>
           </a:p>
@@ -4022,7 +4027,7 @@
                             </p:stCondLst>
                             <p:childTnLst>
                               <p:par>
-                                <p:cTn id="5" presetID="22" presetClass="entr" presetSubtype="4" fill="hold" grpId="0" nodeType="clickEffect">
+                                <p:cTn id="5" presetID="16" presetClass="entr" presetSubtype="21" fill="hold" grpId="0" nodeType="clickEffect">
                                   <p:stCondLst>
                                     <p:cond delay="0"/>
                                   </p:stCondLst>
@@ -4030,59 +4035,6 @@
                                     <p:set>
                                       <p:cBhvr>
                                         <p:cTn id="6" dur="1" fill="hold">
-                                          <p:stCondLst>
-                                            <p:cond delay="0"/>
-                                          </p:stCondLst>
-                                        </p:cTn>
-                                        <p:tgtEl>
-                                          <p:spTgt spid="5"/>
-                                        </p:tgtEl>
-                                        <p:attrNameLst>
-                                          <p:attrName>style.visibility</p:attrName>
-                                        </p:attrNameLst>
-                                      </p:cBhvr>
-                                      <p:to>
-                                        <p:strVal val="visible"/>
-                                      </p:to>
-                                    </p:set>
-                                    <p:animEffect transition="in" filter="wipe(down)">
-                                      <p:cBhvr>
-                                        <p:cTn id="7" dur="500"/>
-                                        <p:tgtEl>
-                                          <p:spTgt spid="5"/>
-                                        </p:tgtEl>
-                                      </p:cBhvr>
-                                    </p:animEffect>
-                                  </p:childTnLst>
-                                </p:cTn>
-                              </p:par>
-                            </p:childTnLst>
-                          </p:cTn>
-                        </p:par>
-                      </p:childTnLst>
-                    </p:cTn>
-                  </p:par>
-                  <p:par>
-                    <p:cTn id="8" fill="hold">
-                      <p:stCondLst>
-                        <p:cond delay="indefinite"/>
-                      </p:stCondLst>
-                      <p:childTnLst>
-                        <p:par>
-                          <p:cTn id="9" fill="hold">
-                            <p:stCondLst>
-                              <p:cond delay="0"/>
-                            </p:stCondLst>
-                            <p:childTnLst>
-                              <p:par>
-                                <p:cTn id="10" presetID="16" presetClass="entr" presetSubtype="21" fill="hold" grpId="0" nodeType="clickEffect">
-                                  <p:stCondLst>
-                                    <p:cond delay="0"/>
-                                  </p:stCondLst>
-                                  <p:childTnLst>
-                                    <p:set>
-                                      <p:cBhvr>
-                                        <p:cTn id="11" dur="1" fill="hold">
                                           <p:stCondLst>
                                             <p:cond delay="0"/>
                                           </p:stCondLst>
@@ -4100,7 +4052,7 @@
                                     </p:set>
                                     <p:animEffect transition="in" filter="barn(inVertical)">
                                       <p:cBhvr>
-                                        <p:cTn id="12" dur="1000"/>
+                                        <p:cTn id="7" dur="750"/>
                                         <p:tgtEl>
                                           <p:spTgt spid="4"/>
                                         </p:tgtEl>
@@ -4112,30 +4064,21 @@
                             </p:childTnLst>
                           </p:cTn>
                         </p:par>
-                      </p:childTnLst>
-                    </p:cTn>
-                  </p:par>
-                  <p:par>
-                    <p:cTn id="13" fill="hold">
-                      <p:stCondLst>
-                        <p:cond delay="indefinite"/>
-                      </p:stCondLst>
-                      <p:childTnLst>
                         <p:par>
-                          <p:cTn id="14" fill="hold">
+                          <p:cTn id="8" fill="hold">
                             <p:stCondLst>
-                              <p:cond delay="0"/>
+                              <p:cond delay="750"/>
                             </p:stCondLst>
                             <p:childTnLst>
                               <p:par>
-                                <p:cTn id="15" presetID="31" presetClass="entr" presetSubtype="0" fill="hold" nodeType="clickEffect">
+                                <p:cTn id="9" presetID="31" presetClass="entr" presetSubtype="0" fill="hold" nodeType="afterEffect">
                                   <p:stCondLst>
-                                    <p:cond delay="500"/>
+                                    <p:cond delay="0"/>
                                   </p:stCondLst>
                                   <p:childTnLst>
                                     <p:set>
                                       <p:cBhvr>
-                                        <p:cTn id="16" dur="1" fill="hold">
+                                        <p:cTn id="10" dur="1" fill="hold">
                                           <p:stCondLst>
                                             <p:cond delay="0"/>
                                           </p:stCondLst>
@@ -4153,7 +4096,7 @@
                                     </p:set>
                                     <p:anim calcmode="lin" valueType="num">
                                       <p:cBhvr>
-                                        <p:cTn id="17" dur="1000" fill="hold"/>
+                                        <p:cTn id="11" dur="1000" fill="hold"/>
                                         <p:tgtEl>
                                           <p:spTgt spid="29"/>
                                         </p:tgtEl>
@@ -4176,7 +4119,7 @@
                                     </p:anim>
                                     <p:anim calcmode="lin" valueType="num">
                                       <p:cBhvr>
-                                        <p:cTn id="18" dur="1000" fill="hold"/>
+                                        <p:cTn id="12" dur="1000" fill="hold"/>
                                         <p:tgtEl>
                                           <p:spTgt spid="29"/>
                                         </p:tgtEl>
@@ -4199,7 +4142,7 @@
                                     </p:anim>
                                     <p:anim calcmode="lin" valueType="num">
                                       <p:cBhvr>
-                                        <p:cTn id="19" dur="1000" fill="hold"/>
+                                        <p:cTn id="13" dur="1000" fill="hold"/>
                                         <p:tgtEl>
                                           <p:spTgt spid="29"/>
                                         </p:tgtEl>
@@ -4222,7 +4165,7 @@
                                     </p:anim>
                                     <p:animEffect transition="in" filter="fade">
                                       <p:cBhvr>
-                                        <p:cTn id="20" dur="1000"/>
+                                        <p:cTn id="14" dur="1000"/>
                                         <p:tgtEl>
                                           <p:spTgt spid="29"/>
                                         </p:tgtEl>
@@ -4234,30 +4177,21 @@
                             </p:childTnLst>
                           </p:cTn>
                         </p:par>
-                      </p:childTnLst>
-                    </p:cTn>
-                  </p:par>
-                  <p:par>
-                    <p:cTn id="21" fill="hold">
-                      <p:stCondLst>
-                        <p:cond delay="indefinite"/>
-                      </p:stCondLst>
-                      <p:childTnLst>
                         <p:par>
-                          <p:cTn id="22" fill="hold">
+                          <p:cTn id="15" fill="hold">
                             <p:stCondLst>
-                              <p:cond delay="0"/>
+                              <p:cond delay="1750"/>
                             </p:stCondLst>
                             <p:childTnLst>
                               <p:par>
-                                <p:cTn id="23" presetID="21" presetClass="entr" presetSubtype="1" fill="hold" grpId="0" nodeType="clickEffect">
+                                <p:cTn id="16" presetID="21" presetClass="entr" presetSubtype="1" fill="hold" grpId="0" nodeType="afterEffect">
                                   <p:stCondLst>
-                                    <p:cond delay="500"/>
+                                    <p:cond delay="0"/>
                                   </p:stCondLst>
                                   <p:childTnLst>
                                     <p:set>
                                       <p:cBhvr>
-                                        <p:cTn id="24" dur="1" fill="hold">
+                                        <p:cTn id="17" dur="1" fill="hold">
                                           <p:stCondLst>
                                             <p:cond delay="0"/>
                                           </p:stCondLst>
@@ -4275,7 +4209,7 @@
                                     </p:set>
                                     <p:animEffect transition="in" filter="wheel(1)">
                                       <p:cBhvr>
-                                        <p:cTn id="25" dur="2000"/>
+                                        <p:cTn id="18" dur="2000"/>
                                         <p:tgtEl>
                                           <p:spTgt spid="26"/>
                                         </p:tgtEl>
@@ -4314,7 +4248,6 @@
     <p:bldLst>
       <p:bldP spid="26" grpId="0" animBg="1"/>
       <p:bldP spid="4" grpId="0" animBg="1"/>
-      <p:bldP spid="5" grpId="0" animBg="1"/>
     </p:bldLst>
   </p:timing>
 </p:sld>

</xml_diff>